<commit_message>
Fix all issues which are found on reddit
https://www.reddit.com/r/csharp/comments/k1e347/c_9_cheatsheet/
</commit_message>
<xml_diff>
--- a/CSharp_9_CheatSheet.pptx
+++ b/CSharp_9_CheatSheet.pptx
@@ -201,7 +201,7 @@
           <a:p>
             <a:fld id="{55F3AE7A-28CB-4E56-A242-B88DB1AA0960}" type="datetimeFigureOut">
               <a:rPr lang="de-DE" smtClean="0"/>
-              <a:t>26.11.2020</a:t>
+              <a:t>30.11.2020</a:t>
             </a:fld>
             <a:endParaRPr lang="de-DE"/>
           </a:p>
@@ -600,7 +600,7 @@
           <a:p>
             <a:fld id="{A67BCFFB-2393-4869-8750-FC8D46ABD5E9}" type="datetimeFigureOut">
               <a:rPr lang="de-DE" smtClean="0"/>
-              <a:t>26.11.2020</a:t>
+              <a:t>30.11.2020</a:t>
             </a:fld>
             <a:endParaRPr lang="de-DE"/>
           </a:p>
@@ -770,7 +770,7 @@
           <a:p>
             <a:fld id="{A67BCFFB-2393-4869-8750-FC8D46ABD5E9}" type="datetimeFigureOut">
               <a:rPr lang="de-DE" smtClean="0"/>
-              <a:t>26.11.2020</a:t>
+              <a:t>30.11.2020</a:t>
             </a:fld>
             <a:endParaRPr lang="de-DE"/>
           </a:p>
@@ -950,7 +950,7 @@
           <a:p>
             <a:fld id="{A67BCFFB-2393-4869-8750-FC8D46ABD5E9}" type="datetimeFigureOut">
               <a:rPr lang="de-DE" smtClean="0"/>
-              <a:t>26.11.2020</a:t>
+              <a:t>30.11.2020</a:t>
             </a:fld>
             <a:endParaRPr lang="de-DE"/>
           </a:p>
@@ -1120,7 +1120,7 @@
           <a:p>
             <a:fld id="{A67BCFFB-2393-4869-8750-FC8D46ABD5E9}" type="datetimeFigureOut">
               <a:rPr lang="de-DE" smtClean="0"/>
-              <a:t>26.11.2020</a:t>
+              <a:t>30.11.2020</a:t>
             </a:fld>
             <a:endParaRPr lang="de-DE"/>
           </a:p>
@@ -1366,7 +1366,7 @@
           <a:p>
             <a:fld id="{A67BCFFB-2393-4869-8750-FC8D46ABD5E9}" type="datetimeFigureOut">
               <a:rPr lang="de-DE" smtClean="0"/>
-              <a:t>26.11.2020</a:t>
+              <a:t>30.11.2020</a:t>
             </a:fld>
             <a:endParaRPr lang="de-DE"/>
           </a:p>
@@ -1598,7 +1598,7 @@
           <a:p>
             <a:fld id="{A67BCFFB-2393-4869-8750-FC8D46ABD5E9}" type="datetimeFigureOut">
               <a:rPr lang="de-DE" smtClean="0"/>
-              <a:t>26.11.2020</a:t>
+              <a:t>30.11.2020</a:t>
             </a:fld>
             <a:endParaRPr lang="de-DE"/>
           </a:p>
@@ -1965,7 +1965,7 @@
           <a:p>
             <a:fld id="{A67BCFFB-2393-4869-8750-FC8D46ABD5E9}" type="datetimeFigureOut">
               <a:rPr lang="de-DE" smtClean="0"/>
-              <a:t>26.11.2020</a:t>
+              <a:t>30.11.2020</a:t>
             </a:fld>
             <a:endParaRPr lang="de-DE"/>
           </a:p>
@@ -2083,7 +2083,7 @@
           <a:p>
             <a:fld id="{A67BCFFB-2393-4869-8750-FC8D46ABD5E9}" type="datetimeFigureOut">
               <a:rPr lang="de-DE" smtClean="0"/>
-              <a:t>26.11.2020</a:t>
+              <a:t>30.11.2020</a:t>
             </a:fld>
             <a:endParaRPr lang="de-DE"/>
           </a:p>
@@ -2178,7 +2178,7 @@
           <a:p>
             <a:fld id="{A67BCFFB-2393-4869-8750-FC8D46ABD5E9}" type="datetimeFigureOut">
               <a:rPr lang="de-DE" smtClean="0"/>
-              <a:t>26.11.2020</a:t>
+              <a:t>30.11.2020</a:t>
             </a:fld>
             <a:endParaRPr lang="de-DE"/>
           </a:p>
@@ -2455,7 +2455,7 @@
           <a:p>
             <a:fld id="{A67BCFFB-2393-4869-8750-FC8D46ABD5E9}" type="datetimeFigureOut">
               <a:rPr lang="de-DE" smtClean="0"/>
-              <a:t>26.11.2020</a:t>
+              <a:t>30.11.2020</a:t>
             </a:fld>
             <a:endParaRPr lang="de-DE"/>
           </a:p>
@@ -2708,7 +2708,7 @@
           <a:p>
             <a:fld id="{A67BCFFB-2393-4869-8750-FC8D46ABD5E9}" type="datetimeFigureOut">
               <a:rPr lang="de-DE" smtClean="0"/>
-              <a:t>26.11.2020</a:t>
+              <a:t>30.11.2020</a:t>
             </a:fld>
             <a:endParaRPr lang="de-DE"/>
           </a:p>
@@ -2921,7 +2921,7 @@
           <a:p>
             <a:fld id="{A67BCFFB-2393-4869-8750-FC8D46ABD5E9}" type="datetimeFigureOut">
               <a:rPr lang="de-DE" smtClean="0"/>
-              <a:t>26.11.2020</a:t>
+              <a:t>30.11.2020</a:t>
             </a:fld>
             <a:endParaRPr lang="de-DE"/>
           </a:p>
@@ -3371,7 +3371,7 @@
           <p:nvPr>
             <p:extLst>
               <p:ext uri="{D42A27DB-BD31-4B8C-83A1-F6EECF244321}">
-                <p14:modId xmlns:p14="http://schemas.microsoft.com/office/powerpoint/2010/main" val="3024200436"/>
+                <p14:modId xmlns:p14="http://schemas.microsoft.com/office/powerpoint/2010/main" val="1610810520"/>
               </p:ext>
             </p:extLst>
           </p:nvPr>
@@ -3423,7 +3423,7 @@
                     <a:p>
                       <a:r>
                         <a:rPr lang="en-US" sz="1200" baseline="0" dirty="0"/>
-                        <a:t>A new C# type is immutable by default. The equality between Records is compared by structure or by reference. </a:t>
+                        <a:t>A new C# type that is immutable by default. The equality between Records is compared by structure or by reference. </a:t>
                       </a:r>
                     </a:p>
                     <a:p>
@@ -4403,7 +4403,7 @@
           <p:nvPr>
             <p:extLst>
               <p:ext uri="{D42A27DB-BD31-4B8C-83A1-F6EECF244321}">
-                <p14:modId xmlns:p14="http://schemas.microsoft.com/office/powerpoint/2010/main" val="4245659062"/>
+                <p14:modId xmlns:p14="http://schemas.microsoft.com/office/powerpoint/2010/main" val="2074439948"/>
               </p:ext>
             </p:extLst>
           </p:nvPr>
@@ -4514,7 +4514,7 @@
                       </a:r>
                       <a:r>
                         <a:rPr lang="en-US" sz="1200" dirty="0"/>
-                        <a:t>Permit the programmer to combine multiple patterns on one line, with AND/OR operators, or to negate a pattern by using the NOT operator.</a:t>
+                        <a:t>Permit the programmer to combine multiple patterns on one line with AND/OR operators or to negate a pattern by using the NOT operator.</a:t>
                       </a:r>
                     </a:p>
                     <a:p>
@@ -5973,7 +5973,7 @@
           <p:nvPr>
             <p:extLst>
               <p:ext uri="{D42A27DB-BD31-4B8C-83A1-F6EECF244321}">
-                <p14:modId xmlns:p14="http://schemas.microsoft.com/office/powerpoint/2010/main" val="3873071282"/>
+                <p14:modId xmlns:p14="http://schemas.microsoft.com/office/powerpoint/2010/main" val="836163661"/>
               </p:ext>
             </p:extLst>
           </p:nvPr>
@@ -6130,26 +6130,29 @@
                         <a:t>true</a:t>
                       </a:r>
                       <a:r>
-                        <a:rPr lang="en-US" sz="1000" b="0" dirty="0">
+                        <a:rPr lang="en-US" sz="1000" b="0">
                           <a:latin typeface="Consolas" panose="020B0609020204030204" pitchFamily="49" charset="0"/>
                         </a:rPr>
                         <a:t>, </a:t>
                       </a:r>
                       <a:r>
-                        <a:rPr lang="en-US" sz="1000" b="0" dirty="0">
-                          <a:solidFill>
-                            <a:srgbClr val="0000FF"/>
-                          </a:solidFill>
-                          <a:latin typeface="Consolas" panose="020B0609020204030204" pitchFamily="49" charset="0"/>
-                        </a:rPr>
-                        <a:t>11</a:t>
-                      </a:r>
-                      <a:r>
-                        <a:rPr lang="en-US" sz="1000" b="0" dirty="0">
+                        <a:rPr lang="en-US" sz="1000" b="0">
+                          <a:solidFill>
+                            <a:srgbClr val="0000FF"/>
+                          </a:solidFill>
+                          <a:latin typeface="Consolas" panose="020B0609020204030204" pitchFamily="49" charset="0"/>
+                        </a:rPr>
+                        <a:t>10</a:t>
+                      </a:r>
+                      <a:r>
+                        <a:rPr lang="en-US" sz="1000" b="0">
                           <a:latin typeface="Consolas" panose="020B0609020204030204" pitchFamily="49" charset="0"/>
                         </a:rPr>
                         <a:t>);</a:t>
                       </a:r>
+                      <a:endParaRPr lang="en-US" sz="1000" b="0" dirty="0">
+                        <a:latin typeface="Consolas" panose="020B0609020204030204" pitchFamily="49" charset="0"/>
+                      </a:endParaRPr>
                     </a:p>
                     <a:p>
                       <a:r>
@@ -7538,7 +7541,7 @@
           <p:nvPr>
             <p:extLst>
               <p:ext uri="{D42A27DB-BD31-4B8C-83A1-F6EECF244321}">
-                <p14:modId xmlns:p14="http://schemas.microsoft.com/office/powerpoint/2010/main" val="156276744"/>
+                <p14:modId xmlns:p14="http://schemas.microsoft.com/office/powerpoint/2010/main" val="2181405718"/>
               </p:ext>
             </p:extLst>
           </p:nvPr>
@@ -7607,7 +7610,7 @@
                     <a:p>
                       <a:r>
                         <a:rPr lang="en-US" sz="1200" dirty="0"/>
-                        <a:t>This feature allows you to omit the type of the object you are instantiating.  </a:t>
+                        <a:t>This feature allows you to omit the type of object you are instantiating.  </a:t>
                       </a:r>
                     </a:p>
                     <a:p>
@@ -8516,7 +8519,7 @@
           <p:nvPr>
             <p:extLst>
               <p:ext uri="{D42A27DB-BD31-4B8C-83A1-F6EECF244321}">
-                <p14:modId xmlns:p14="http://schemas.microsoft.com/office/powerpoint/2010/main" val="2393982608"/>
+                <p14:modId xmlns:p14="http://schemas.microsoft.com/office/powerpoint/2010/main" val="2448277651"/>
               </p:ext>
             </p:extLst>
           </p:nvPr>
@@ -8547,10 +8550,16 @@
                     <a:lstStyle/>
                     <a:p>
                       <a:r>
+                        <a:rPr lang="en-US" sz="1800" dirty="0">
+                          <a:latin typeface="Consolas" panose="020B0609020204030204" pitchFamily="49" charset="0"/>
+                        </a:rPr>
+                        <a:t>Extension </a:t>
+                      </a:r>
+                      <a:r>
                         <a:rPr lang="en-US" sz="1800" dirty="0" err="1">
                           <a:latin typeface="Consolas" panose="020B0609020204030204" pitchFamily="49" charset="0"/>
                         </a:rPr>
-                        <a:t>GetEmurator</a:t>
+                        <a:t>GetEnumerator</a:t>
                       </a:r>
                       <a:endParaRPr lang="en-US" sz="1800" dirty="0"/>
                     </a:p>
@@ -9524,7 +9533,7 @@
           <p:nvPr>
             <p:extLst>
               <p:ext uri="{D42A27DB-BD31-4B8C-83A1-F6EECF244321}">
-                <p14:modId xmlns:p14="http://schemas.microsoft.com/office/powerpoint/2010/main" val="1714331534"/>
+                <p14:modId xmlns:p14="http://schemas.microsoft.com/office/powerpoint/2010/main" val="4047584241"/>
               </p:ext>
             </p:extLst>
           </p:nvPr>
@@ -9601,7 +9610,7 @@
                           <a:ea typeface="+mn-ea"/>
                           <a:cs typeface="+mn-cs"/>
                         </a:rPr>
-                        <a:t>This feature allows you to remove the restrictions of the partial method (</a:t>
+                        <a:t>This feature allows you to remove the partial method's restrictions (</a:t>
                       </a:r>
                       <a:r>
                         <a:rPr lang="en-US" sz="1200" i="1" kern="1200" dirty="0">
@@ -10171,7 +10180,7 @@
           <p:nvPr>
             <p:extLst>
               <p:ext uri="{D42A27DB-BD31-4B8C-83A1-F6EECF244321}">
-                <p14:modId xmlns:p14="http://schemas.microsoft.com/office/powerpoint/2010/main" val="2511035093"/>
+                <p14:modId xmlns:p14="http://schemas.microsoft.com/office/powerpoint/2010/main" val="994257890"/>
               </p:ext>
             </p:extLst>
           </p:nvPr>
@@ -10223,7 +10232,7 @@
                     <a:p>
                       <a:r>
                         <a:rPr lang="en-US" sz="1200" dirty="0"/>
-                        <a:t>This feature allows you to use the static keyword for lambdas to prevent capturing locals and parameters</a:t>
+                        <a:t>This feature allows you to use the static keyword for lambdas to prevent capturing locals and parameters.</a:t>
                       </a:r>
                     </a:p>
                     <a:p>
@@ -10500,7 +10509,7 @@
                     <a:p>
                       <a:r>
                         <a:rPr lang="en-US" sz="1200" dirty="0"/>
-                        <a:t>Anonymous methods need allocations and this feature might help to make the anonymous methods more performance.</a:t>
+                        <a:t>Anonymous methods need allocations, and this feature might help to make it more performant.</a:t>
                       </a:r>
                       <a:endParaRPr lang="en-US" sz="1200" dirty="0">
                         <a:latin typeface="Consolas" panose="020B0609020204030204" pitchFamily="49" charset="0"/>

</xml_diff>

<commit_message>
Add Inheritance: to Records, more color, fix the colors issues, formatting
Add Inheritance: to Records, more color, fix the colors issues, formatting
</commit_message>
<xml_diff>
--- a/CSharp_9_CheatSheet.pptx
+++ b/CSharp_9_CheatSheet.pptx
@@ -201,7 +201,7 @@
           <a:p>
             <a:fld id="{55F3AE7A-28CB-4E56-A242-B88DB1AA0960}" type="datetimeFigureOut">
               <a:rPr lang="de-DE" smtClean="0"/>
-              <a:t>01.12.2020</a:t>
+              <a:t>07.12.2020</a:t>
             </a:fld>
             <a:endParaRPr lang="de-DE"/>
           </a:p>
@@ -600,7 +600,7 @@
           <a:p>
             <a:fld id="{A67BCFFB-2393-4869-8750-FC8D46ABD5E9}" type="datetimeFigureOut">
               <a:rPr lang="de-DE" smtClean="0"/>
-              <a:t>01.12.2020</a:t>
+              <a:t>07.12.2020</a:t>
             </a:fld>
             <a:endParaRPr lang="de-DE"/>
           </a:p>
@@ -770,7 +770,7 @@
           <a:p>
             <a:fld id="{A67BCFFB-2393-4869-8750-FC8D46ABD5E9}" type="datetimeFigureOut">
               <a:rPr lang="de-DE" smtClean="0"/>
-              <a:t>01.12.2020</a:t>
+              <a:t>07.12.2020</a:t>
             </a:fld>
             <a:endParaRPr lang="de-DE"/>
           </a:p>
@@ -950,7 +950,7 @@
           <a:p>
             <a:fld id="{A67BCFFB-2393-4869-8750-FC8D46ABD5E9}" type="datetimeFigureOut">
               <a:rPr lang="de-DE" smtClean="0"/>
-              <a:t>01.12.2020</a:t>
+              <a:t>07.12.2020</a:t>
             </a:fld>
             <a:endParaRPr lang="de-DE"/>
           </a:p>
@@ -1120,7 +1120,7 @@
           <a:p>
             <a:fld id="{A67BCFFB-2393-4869-8750-FC8D46ABD5E9}" type="datetimeFigureOut">
               <a:rPr lang="de-DE" smtClean="0"/>
-              <a:t>01.12.2020</a:t>
+              <a:t>07.12.2020</a:t>
             </a:fld>
             <a:endParaRPr lang="de-DE"/>
           </a:p>
@@ -1366,7 +1366,7 @@
           <a:p>
             <a:fld id="{A67BCFFB-2393-4869-8750-FC8D46ABD5E9}" type="datetimeFigureOut">
               <a:rPr lang="de-DE" smtClean="0"/>
-              <a:t>01.12.2020</a:t>
+              <a:t>07.12.2020</a:t>
             </a:fld>
             <a:endParaRPr lang="de-DE"/>
           </a:p>
@@ -1598,7 +1598,7 @@
           <a:p>
             <a:fld id="{A67BCFFB-2393-4869-8750-FC8D46ABD5E9}" type="datetimeFigureOut">
               <a:rPr lang="de-DE" smtClean="0"/>
-              <a:t>01.12.2020</a:t>
+              <a:t>07.12.2020</a:t>
             </a:fld>
             <a:endParaRPr lang="de-DE"/>
           </a:p>
@@ -1965,7 +1965,7 @@
           <a:p>
             <a:fld id="{A67BCFFB-2393-4869-8750-FC8D46ABD5E9}" type="datetimeFigureOut">
               <a:rPr lang="de-DE" smtClean="0"/>
-              <a:t>01.12.2020</a:t>
+              <a:t>07.12.2020</a:t>
             </a:fld>
             <a:endParaRPr lang="de-DE"/>
           </a:p>
@@ -2083,7 +2083,7 @@
           <a:p>
             <a:fld id="{A67BCFFB-2393-4869-8750-FC8D46ABD5E9}" type="datetimeFigureOut">
               <a:rPr lang="de-DE" smtClean="0"/>
-              <a:t>01.12.2020</a:t>
+              <a:t>07.12.2020</a:t>
             </a:fld>
             <a:endParaRPr lang="de-DE"/>
           </a:p>
@@ -2178,7 +2178,7 @@
           <a:p>
             <a:fld id="{A67BCFFB-2393-4869-8750-FC8D46ABD5E9}" type="datetimeFigureOut">
               <a:rPr lang="de-DE" smtClean="0"/>
-              <a:t>01.12.2020</a:t>
+              <a:t>07.12.2020</a:t>
             </a:fld>
             <a:endParaRPr lang="de-DE"/>
           </a:p>
@@ -2455,7 +2455,7 @@
           <a:p>
             <a:fld id="{A67BCFFB-2393-4869-8750-FC8D46ABD5E9}" type="datetimeFigureOut">
               <a:rPr lang="de-DE" smtClean="0"/>
-              <a:t>01.12.2020</a:t>
+              <a:t>07.12.2020</a:t>
             </a:fld>
             <a:endParaRPr lang="de-DE"/>
           </a:p>
@@ -2708,7 +2708,7 @@
           <a:p>
             <a:fld id="{A67BCFFB-2393-4869-8750-FC8D46ABD5E9}" type="datetimeFigureOut">
               <a:rPr lang="de-DE" smtClean="0"/>
-              <a:t>01.12.2020</a:t>
+              <a:t>07.12.2020</a:t>
             </a:fld>
             <a:endParaRPr lang="de-DE"/>
           </a:p>
@@ -2921,7 +2921,7 @@
           <a:p>
             <a:fld id="{A67BCFFB-2393-4869-8750-FC8D46ABD5E9}" type="datetimeFigureOut">
               <a:rPr lang="de-DE" smtClean="0"/>
-              <a:t>01.12.2020</a:t>
+              <a:t>07.12.2020</a:t>
             </a:fld>
             <a:endParaRPr lang="de-DE"/>
           </a:p>
@@ -3326,36 +3326,6 @@
           <a:chExt cx="0" cy="0"/>
         </a:xfrm>
       </p:grpSpPr>
-      <p:pic>
-        <p:nvPicPr>
-          <p:cNvPr id="20" name="Picture 19"/>
-          <p:cNvPicPr>
-            <a:picLocks noChangeAspect="1"/>
-          </p:cNvPicPr>
-          <p:nvPr/>
-        </p:nvPicPr>
-        <p:blipFill>
-          <a:blip r:embed="rId2" cstate="print">
-            <a:extLst>
-              <a:ext uri="{28A0092B-C50C-407E-A947-70E740481C1C}">
-                <a14:useLocalDpi xmlns:a14="http://schemas.microsoft.com/office/drawing/2010/main" val="0"/>
-              </a:ext>
-            </a:extLst>
-          </a:blip>
-          <a:stretch>
-            <a:fillRect/>
-          </a:stretch>
-        </p:blipFill>
-        <p:spPr>
-          <a:xfrm>
-            <a:off x="8447030" y="5221134"/>
-            <a:ext cx="1200151" cy="1200151"/>
-          </a:xfrm>
-          <a:prstGeom prst="rect">
-            <a:avLst/>
-          </a:prstGeom>
-        </p:spPr>
-      </p:pic>
       <p:graphicFrame>
         <p:nvGraphicFramePr>
           <p:cNvPr id="13" name="Table 12">
@@ -3371,14 +3341,14 @@
           <p:nvPr>
             <p:extLst>
               <p:ext uri="{D42A27DB-BD31-4B8C-83A1-F6EECF244321}">
-                <p14:modId xmlns:p14="http://schemas.microsoft.com/office/powerpoint/2010/main" val="1610810520"/>
+                <p14:modId xmlns:p14="http://schemas.microsoft.com/office/powerpoint/2010/main" val="967678009"/>
               </p:ext>
             </p:extLst>
           </p:nvPr>
         </p:nvGraphicFramePr>
         <p:xfrm>
-          <a:off x="6096000" y="182880"/>
-          <a:ext cx="5909570" cy="6477000"/>
+          <a:off x="256299" y="233265"/>
+          <a:ext cx="6370785" cy="6395523"/>
         </p:xfrm>
         <a:graphic>
           <a:graphicData uri="http://schemas.openxmlformats.org/drawingml/2006/table">
@@ -3387,7 +3357,7 @@
                 <a:tableStyleId>{5C22544A-7EE6-4342-B048-85BDC9FD1C3A}</a:tableStyleId>
               </a:tblPr>
               <a:tblGrid>
-                <a:gridCol w="5909570">
+                <a:gridCol w="6370785">
                   <a:extLst>
                     <a:ext uri="{9D8B030D-6E8A-4147-A177-3AD203B41FA5}">
                       <a16:colId xmlns:a16="http://schemas.microsoft.com/office/drawing/2014/main" val="3798824116"/>
@@ -3395,7 +3365,7 @@
                   </a:extLst>
                 </a:gridCol>
               </a:tblGrid>
-              <a:tr h="355485">
+              <a:tr h="380875">
                 <a:tc>
                   <a:txBody>
                     <a:bodyPr/>
@@ -3415,7 +3385,7 @@
                   </a:ext>
                 </a:extLst>
               </a:tr>
-              <a:tr h="6033774">
+              <a:tr h="6014648">
                 <a:tc>
                   <a:txBody>
                     <a:bodyPr/>
@@ -3431,7 +3401,289 @@
                     </a:p>
                     <a:p>
                       <a:r>
-                        <a:rPr lang="en-US" sz="1100" baseline="0" dirty="0">
+                        <a:rPr lang="en-US" sz="1050" baseline="0" dirty="0">
+                          <a:solidFill>
+                            <a:srgbClr val="23735D"/>
+                          </a:solidFill>
+                          <a:latin typeface="Consolas" panose="020B0609020204030204" pitchFamily="49" charset="0"/>
+                        </a:rPr>
+                        <a:t>// Default Record.</a:t>
+                      </a:r>
+                    </a:p>
+                    <a:p>
+                      <a:r>
+                        <a:rPr lang="en-US" sz="1050" baseline="0" dirty="0">
+                          <a:solidFill>
+                            <a:srgbClr val="0000FF"/>
+                          </a:solidFill>
+                          <a:latin typeface="Consolas" panose="020B0609020204030204" pitchFamily="49" charset="0"/>
+                        </a:rPr>
+                        <a:t>public</a:t>
+                      </a:r>
+                      <a:r>
+                        <a:rPr lang="en-US" sz="1050" baseline="0" dirty="0">
+                          <a:latin typeface="Consolas" panose="020B0609020204030204" pitchFamily="49" charset="0"/>
+                        </a:rPr>
+                        <a:t> record </a:t>
+                      </a:r>
+                      <a:r>
+                        <a:rPr lang="en-US" sz="1050" baseline="0" dirty="0">
+                          <a:solidFill>
+                            <a:schemeClr val="bg2">
+                              <a:lumMod val="50000"/>
+                            </a:schemeClr>
+                          </a:solidFill>
+                          <a:latin typeface="Consolas" panose="020B0609020204030204" pitchFamily="49" charset="0"/>
+                        </a:rPr>
+                        <a:t>Person</a:t>
+                      </a:r>
+                      <a:r>
+                        <a:rPr lang="en-US" sz="1050" baseline="0" dirty="0">
+                          <a:latin typeface="Consolas" panose="020B0609020204030204" pitchFamily="49" charset="0"/>
+                        </a:rPr>
+                        <a:t>(</a:t>
+                      </a:r>
+                      <a:r>
+                        <a:rPr lang="en-US" sz="1050" baseline="0" dirty="0">
+                          <a:solidFill>
+                            <a:srgbClr val="0000FF"/>
+                          </a:solidFill>
+                          <a:latin typeface="Consolas" panose="020B0609020204030204" pitchFamily="49" charset="0"/>
+                        </a:rPr>
+                        <a:t>string</a:t>
+                      </a:r>
+                      <a:r>
+                        <a:rPr lang="en-US" sz="1050" baseline="0" dirty="0">
+                          <a:latin typeface="Consolas" panose="020B0609020204030204" pitchFamily="49" charset="0"/>
+                        </a:rPr>
+                        <a:t> Name, </a:t>
+                      </a:r>
+                      <a:r>
+                        <a:rPr lang="en-US" sz="1050" baseline="0" dirty="0">
+                          <a:solidFill>
+                            <a:srgbClr val="0000FF"/>
+                          </a:solidFill>
+                          <a:latin typeface="Consolas" panose="020B0609020204030204" pitchFamily="49" charset="0"/>
+                        </a:rPr>
+                        <a:t>int</a:t>
+                      </a:r>
+                      <a:r>
+                        <a:rPr lang="en-US" sz="1050" baseline="0" dirty="0">
+                          <a:latin typeface="Consolas" panose="020B0609020204030204" pitchFamily="49" charset="0"/>
+                        </a:rPr>
+                        <a:t> Age);</a:t>
+                      </a:r>
+                    </a:p>
+                    <a:p>
+                      <a:endParaRPr lang="en-US" sz="1050" baseline="0" dirty="0">
+                        <a:latin typeface="Consolas" panose="020B0609020204030204" pitchFamily="49" charset="0"/>
+                      </a:endParaRPr>
+                    </a:p>
+                    <a:p>
+                      <a:r>
+                        <a:rPr lang="en-US" sz="1050" baseline="0" dirty="0">
+                          <a:solidFill>
+                            <a:srgbClr val="23735D"/>
+                          </a:solidFill>
+                          <a:latin typeface="Consolas" panose="020B0609020204030204" pitchFamily="49" charset="0"/>
+                        </a:rPr>
+                        <a:t>// Mutable Record.</a:t>
+                      </a:r>
+                    </a:p>
+                    <a:p>
+                      <a:r>
+                        <a:rPr lang="en-US" sz="1050" baseline="0" dirty="0">
+                          <a:solidFill>
+                            <a:srgbClr val="0000FF"/>
+                          </a:solidFill>
+                          <a:latin typeface="Consolas" panose="020B0609020204030204" pitchFamily="49" charset="0"/>
+                        </a:rPr>
+                        <a:t>public record</a:t>
+                      </a:r>
+                      <a:r>
+                        <a:rPr lang="en-US" sz="1050" baseline="0" dirty="0">
+                          <a:latin typeface="Consolas" panose="020B0609020204030204" pitchFamily="49" charset="0"/>
+                        </a:rPr>
+                        <a:t> </a:t>
+                      </a:r>
+                      <a:r>
+                        <a:rPr lang="en-US" sz="1050" baseline="0" dirty="0">
+                          <a:solidFill>
+                            <a:schemeClr val="bg2">
+                              <a:lumMod val="50000"/>
+                            </a:schemeClr>
+                          </a:solidFill>
+                          <a:latin typeface="Consolas" panose="020B0609020204030204" pitchFamily="49" charset="0"/>
+                        </a:rPr>
+                        <a:t>Person</a:t>
+                      </a:r>
+                      <a:r>
+                        <a:rPr lang="en-US" sz="1050" baseline="0" dirty="0">
+                          <a:latin typeface="Consolas" panose="020B0609020204030204" pitchFamily="49" charset="0"/>
+                        </a:rPr>
+                        <a:t>(</a:t>
+                      </a:r>
+                      <a:r>
+                        <a:rPr lang="en-US" sz="1050" baseline="0" dirty="0">
+                          <a:solidFill>
+                            <a:srgbClr val="0000FF"/>
+                          </a:solidFill>
+                          <a:latin typeface="Consolas" panose="020B0609020204030204" pitchFamily="49" charset="0"/>
+                        </a:rPr>
+                        <a:t>string</a:t>
+                      </a:r>
+                      <a:r>
+                        <a:rPr lang="en-US" sz="1050" baseline="0" dirty="0">
+                          <a:latin typeface="Consolas" panose="020B0609020204030204" pitchFamily="49" charset="0"/>
+                        </a:rPr>
+                        <a:t> Name, </a:t>
+                      </a:r>
+                      <a:r>
+                        <a:rPr lang="en-US" sz="1050" baseline="0" dirty="0">
+                          <a:solidFill>
+                            <a:srgbClr val="0000FF"/>
+                          </a:solidFill>
+                          <a:latin typeface="Consolas" panose="020B0609020204030204" pitchFamily="49" charset="0"/>
+                        </a:rPr>
+                        <a:t>int</a:t>
+                      </a:r>
+                      <a:r>
+                        <a:rPr lang="en-US" sz="1050" baseline="0" dirty="0">
+                          <a:latin typeface="Consolas" panose="020B0609020204030204" pitchFamily="49" charset="0"/>
+                        </a:rPr>
+                        <a:t> Age)</a:t>
+                      </a:r>
+                    </a:p>
+                    <a:p>
+                      <a:r>
+                        <a:rPr lang="en-US" sz="1050" baseline="0" dirty="0">
+                          <a:latin typeface="Consolas" panose="020B0609020204030204" pitchFamily="49" charset="0"/>
+                        </a:rPr>
+                        <a:t>{</a:t>
+                      </a:r>
+                    </a:p>
+                    <a:p>
+                      <a:r>
+                        <a:rPr lang="en-US" sz="1050" baseline="0" dirty="0">
+                          <a:latin typeface="Consolas" panose="020B0609020204030204" pitchFamily="49" charset="0"/>
+                        </a:rPr>
+                        <a:t>    </a:t>
+                      </a:r>
+                      <a:r>
+                        <a:rPr lang="en-US" sz="1050" baseline="0" dirty="0">
+                          <a:solidFill>
+                            <a:srgbClr val="0000FF"/>
+                          </a:solidFill>
+                          <a:latin typeface="Consolas" panose="020B0609020204030204" pitchFamily="49" charset="0"/>
+                        </a:rPr>
+                        <a:t>public string </a:t>
+                      </a:r>
+                      <a:r>
+                        <a:rPr lang="en-US" sz="1050" baseline="0" dirty="0">
+                          <a:latin typeface="Consolas" panose="020B0609020204030204" pitchFamily="49" charset="0"/>
+                        </a:rPr>
+                        <a:t>Name { get; set; } = Name;</a:t>
+                      </a:r>
+                    </a:p>
+                    <a:p>
+                      <a:r>
+                        <a:rPr lang="en-US" sz="1050" baseline="0" dirty="0">
+                          <a:latin typeface="Consolas" panose="020B0609020204030204" pitchFamily="49" charset="0"/>
+                        </a:rPr>
+                        <a:t>    </a:t>
+                      </a:r>
+                      <a:r>
+                        <a:rPr lang="en-US" sz="1050" baseline="0" dirty="0">
+                          <a:solidFill>
+                            <a:srgbClr val="0000FF"/>
+                          </a:solidFill>
+                          <a:latin typeface="Consolas" panose="020B0609020204030204" pitchFamily="49" charset="0"/>
+                        </a:rPr>
+                        <a:t>public int </a:t>
+                      </a:r>
+                      <a:r>
+                        <a:rPr lang="en-US" sz="1050" baseline="0" dirty="0">
+                          <a:solidFill>
+                            <a:schemeClr val="tx1"/>
+                          </a:solidFill>
+                          <a:latin typeface="Consolas" panose="020B0609020204030204" pitchFamily="49" charset="0"/>
+                        </a:rPr>
+                        <a:t>Age</a:t>
+                      </a:r>
+                      <a:r>
+                        <a:rPr lang="en-US" sz="1050" baseline="0" dirty="0">
+                          <a:solidFill>
+                            <a:srgbClr val="0000FF"/>
+                          </a:solidFill>
+                          <a:latin typeface="Consolas" panose="020B0609020204030204" pitchFamily="49" charset="0"/>
+                        </a:rPr>
+                        <a:t> </a:t>
+                      </a:r>
+                      <a:r>
+                        <a:rPr lang="en-US" sz="1050" baseline="0" dirty="0">
+                          <a:latin typeface="Consolas" panose="020B0609020204030204" pitchFamily="49" charset="0"/>
+                        </a:rPr>
+                        <a:t>{ get; set; } = Age;</a:t>
+                      </a:r>
+                    </a:p>
+                    <a:p>
+                      <a:r>
+                        <a:rPr lang="en-US" sz="1050" baseline="0" dirty="0">
+                          <a:latin typeface="Consolas" panose="020B0609020204030204" pitchFamily="49" charset="0"/>
+                        </a:rPr>
+                        <a:t>}</a:t>
+                      </a:r>
+                    </a:p>
+                    <a:p>
+                      <a:r>
+                        <a:rPr lang="en-US" sz="1050" baseline="0" dirty="0">
+                          <a:solidFill>
+                            <a:srgbClr val="0000FF"/>
+                          </a:solidFill>
+                          <a:latin typeface="Consolas" panose="020B0609020204030204" pitchFamily="49" charset="0"/>
+                        </a:rPr>
+                        <a:t>var</a:t>
+                      </a:r>
+                      <a:r>
+                        <a:rPr lang="en-US" sz="1050" baseline="0" dirty="0">
+                          <a:latin typeface="Consolas" panose="020B0609020204030204" pitchFamily="49" charset="0"/>
+                        </a:rPr>
+                        <a:t> person1 = </a:t>
+                      </a:r>
+                      <a:r>
+                        <a:rPr lang="en-US" sz="1050" baseline="0" dirty="0">
+                          <a:solidFill>
+                            <a:srgbClr val="0000FF"/>
+                          </a:solidFill>
+                          <a:latin typeface="Consolas" panose="020B0609020204030204" pitchFamily="49" charset="0"/>
+                        </a:rPr>
+                        <a:t>new</a:t>
+                      </a:r>
+                      <a:r>
+                        <a:rPr lang="en-US" sz="1050" baseline="0" dirty="0">
+                          <a:latin typeface="Consolas" panose="020B0609020204030204" pitchFamily="49" charset="0"/>
+                        </a:rPr>
+                        <a:t> </a:t>
+                      </a:r>
+                      <a:r>
+                        <a:rPr lang="en-US" sz="1050" baseline="0" dirty="0">
+                          <a:solidFill>
+                            <a:schemeClr val="bg2">
+                              <a:lumMod val="50000"/>
+                            </a:schemeClr>
+                          </a:solidFill>
+                          <a:latin typeface="Consolas" panose="020B0609020204030204" pitchFamily="49" charset="0"/>
+                        </a:rPr>
+                        <a:t>Person</a:t>
+                      </a:r>
+                      <a:r>
+                        <a:rPr lang="en-US" sz="1050" baseline="0" dirty="0">
+                          <a:latin typeface="Consolas" panose="020B0609020204030204" pitchFamily="49" charset="0"/>
+                        </a:rPr>
+                        <a:t>("</a:t>
+                      </a:r>
+                      <a:r>
+                        <a:rPr lang="en-US" sz="1050" baseline="0" dirty="0">
                           <a:solidFill>
                             <a:schemeClr val="accent6">
                               <a:lumMod val="75000"/>
@@ -3439,64 +3691,80 @@
                           </a:solidFill>
                           <a:latin typeface="Consolas" panose="020B0609020204030204" pitchFamily="49" charset="0"/>
                         </a:rPr>
-                        <a:t>// Default Record.</a:t>
-                      </a:r>
-                    </a:p>
-                    <a:p>
-                      <a:r>
-                        <a:rPr lang="en-US" sz="1100" baseline="0" dirty="0">
-                          <a:solidFill>
-                            <a:srgbClr val="0000FF"/>
-                          </a:solidFill>
-                          <a:latin typeface="Consolas" panose="020B0609020204030204" pitchFamily="49" charset="0"/>
-                        </a:rPr>
-                        <a:t>public</a:t>
-                      </a:r>
-                      <a:r>
-                        <a:rPr lang="en-US" sz="1100" baseline="0" dirty="0">
-                          <a:latin typeface="Consolas" panose="020B0609020204030204" pitchFamily="49" charset="0"/>
-                        </a:rPr>
-                        <a:t> record Person(</a:t>
-                      </a:r>
-                      <a:r>
-                        <a:rPr lang="en-US" sz="1100" baseline="0" dirty="0">
-                          <a:solidFill>
-                            <a:srgbClr val="0000FF"/>
-                          </a:solidFill>
-                          <a:latin typeface="Consolas" panose="020B0609020204030204" pitchFamily="49" charset="0"/>
-                        </a:rPr>
-                        <a:t>string</a:t>
-                      </a:r>
-                      <a:r>
-                        <a:rPr lang="en-US" sz="1100" baseline="0" dirty="0">
-                          <a:latin typeface="Consolas" panose="020B0609020204030204" pitchFamily="49" charset="0"/>
-                        </a:rPr>
-                        <a:t> Name, </a:t>
-                      </a:r>
-                      <a:r>
-                        <a:rPr lang="en-US" sz="1100" baseline="0" dirty="0">
-                          <a:solidFill>
-                            <a:srgbClr val="0000FF"/>
-                          </a:solidFill>
-                          <a:latin typeface="Consolas" panose="020B0609020204030204" pitchFamily="49" charset="0"/>
-                        </a:rPr>
-                        <a:t>int</a:t>
-                      </a:r>
-                      <a:r>
-                        <a:rPr lang="en-US" sz="1100" baseline="0" dirty="0">
-                          <a:latin typeface="Consolas" panose="020B0609020204030204" pitchFamily="49" charset="0"/>
-                        </a:rPr>
-                        <a:t> Age);</a:t>
-                      </a:r>
-                    </a:p>
-                    <a:p>
-                      <a:endParaRPr lang="en-US" sz="1100" baseline="0" dirty="0">
-                        <a:latin typeface="Consolas" panose="020B0609020204030204" pitchFamily="49" charset="0"/>
-                      </a:endParaRPr>
-                    </a:p>
-                    <a:p>
-                      <a:r>
-                        <a:rPr lang="en-US" sz="1100" baseline="0" dirty="0">
+                        <a:t>Bassam Alugili</a:t>
+                      </a:r>
+                      <a:r>
+                        <a:rPr lang="en-US" sz="1050" baseline="0" dirty="0">
+                          <a:latin typeface="Consolas" panose="020B0609020204030204" pitchFamily="49" charset="0"/>
+                        </a:rPr>
+                        <a:t>", </a:t>
+                      </a:r>
+                      <a:r>
+                        <a:rPr lang="en-US" sz="1050" baseline="0" dirty="0">
+                          <a:solidFill>
+                            <a:srgbClr val="0000FF"/>
+                          </a:solidFill>
+                          <a:latin typeface="Consolas" panose="020B0609020204030204" pitchFamily="49" charset="0"/>
+                        </a:rPr>
+                        <a:t>42</a:t>
+                      </a:r>
+                      <a:r>
+                        <a:rPr lang="en-US" sz="1050" baseline="0" dirty="0">
+                          <a:latin typeface="Consolas" panose="020B0609020204030204" pitchFamily="49" charset="0"/>
+                        </a:rPr>
+                        <a:t>);</a:t>
+                      </a:r>
+                    </a:p>
+                    <a:p>
+                      <a:r>
+                        <a:rPr lang="en-US" sz="1050" baseline="0" dirty="0">
+                          <a:solidFill>
+                            <a:srgbClr val="0000FF"/>
+                          </a:solidFill>
+                          <a:latin typeface="Consolas" panose="020B0609020204030204" pitchFamily="49" charset="0"/>
+                        </a:rPr>
+                        <a:t>var</a:t>
+                      </a:r>
+                      <a:r>
+                        <a:rPr lang="en-US" sz="1050" baseline="0" dirty="0">
+                          <a:latin typeface="Consolas" panose="020B0609020204030204" pitchFamily="49" charset="0"/>
+                        </a:rPr>
+                        <a:t> person2 = </a:t>
+                      </a:r>
+                      <a:r>
+                        <a:rPr lang="en-US" sz="1050" baseline="0" dirty="0">
+                          <a:solidFill>
+                            <a:srgbClr val="0000FF"/>
+                          </a:solidFill>
+                          <a:latin typeface="Consolas" panose="020B0609020204030204" pitchFamily="49" charset="0"/>
+                        </a:rPr>
+                        <a:t>new</a:t>
+                      </a:r>
+                      <a:r>
+                        <a:rPr lang="en-US" sz="1050" baseline="0" dirty="0">
+                          <a:latin typeface="Consolas" panose="020B0609020204030204" pitchFamily="49" charset="0"/>
+                        </a:rPr>
+                        <a:t> </a:t>
+                      </a:r>
+                      <a:r>
+                        <a:rPr lang="en-US" sz="1050" baseline="0" dirty="0">
+                          <a:solidFill>
+                            <a:schemeClr val="bg2">
+                              <a:lumMod val="50000"/>
+                            </a:schemeClr>
+                          </a:solidFill>
+                          <a:latin typeface="Consolas" panose="020B0609020204030204" pitchFamily="49" charset="0"/>
+                        </a:rPr>
+                        <a:t>Person</a:t>
+                      </a:r>
+                      <a:r>
+                        <a:rPr lang="en-US" sz="1050" baseline="0" dirty="0">
+                          <a:latin typeface="Consolas" panose="020B0609020204030204" pitchFamily="49" charset="0"/>
+                        </a:rPr>
+                        <a:t>("</a:t>
+                      </a:r>
+                      <a:r>
+                        <a:rPr lang="en-US" sz="1050" baseline="0" dirty="0">
                           <a:solidFill>
                             <a:schemeClr val="accent6">
                               <a:lumMod val="75000"/>
@@ -3504,287 +3772,53 @@
                           </a:solidFill>
                           <a:latin typeface="Consolas" panose="020B0609020204030204" pitchFamily="49" charset="0"/>
                         </a:rPr>
-                        <a:t>// Mutable Record.</a:t>
-                      </a:r>
-                    </a:p>
-                    <a:p>
-                      <a:r>
-                        <a:rPr lang="en-US" sz="1100" baseline="0" dirty="0">
-                          <a:solidFill>
-                            <a:srgbClr val="0000FF"/>
-                          </a:solidFill>
-                          <a:latin typeface="Consolas" panose="020B0609020204030204" pitchFamily="49" charset="0"/>
-                        </a:rPr>
-                        <a:t>public record</a:t>
-                      </a:r>
-                      <a:r>
-                        <a:rPr lang="en-US" sz="1100" baseline="0" dirty="0">
-                          <a:latin typeface="Consolas" panose="020B0609020204030204" pitchFamily="49" charset="0"/>
-                        </a:rPr>
-                        <a:t> Person(</a:t>
-                      </a:r>
-                      <a:r>
-                        <a:rPr lang="en-US" sz="1100" baseline="0" dirty="0">
-                          <a:solidFill>
-                            <a:srgbClr val="0000FF"/>
-                          </a:solidFill>
-                          <a:latin typeface="Consolas" panose="020B0609020204030204" pitchFamily="49" charset="0"/>
-                        </a:rPr>
-                        <a:t>string</a:t>
-                      </a:r>
-                      <a:r>
-                        <a:rPr lang="en-US" sz="1100" baseline="0" dirty="0">
-                          <a:latin typeface="Consolas" panose="020B0609020204030204" pitchFamily="49" charset="0"/>
-                        </a:rPr>
-                        <a:t> Name, </a:t>
-                      </a:r>
-                      <a:r>
-                        <a:rPr lang="en-US" sz="1100" baseline="0" dirty="0">
-                          <a:solidFill>
-                            <a:srgbClr val="0000FF"/>
-                          </a:solidFill>
-                          <a:latin typeface="Consolas" panose="020B0609020204030204" pitchFamily="49" charset="0"/>
-                        </a:rPr>
-                        <a:t>int</a:t>
-                      </a:r>
-                      <a:r>
-                        <a:rPr lang="en-US" sz="1100" baseline="0" dirty="0">
-                          <a:latin typeface="Consolas" panose="020B0609020204030204" pitchFamily="49" charset="0"/>
-                        </a:rPr>
-                        <a:t> Age)</a:t>
-                      </a:r>
-                    </a:p>
-                    <a:p>
-                      <a:r>
-                        <a:rPr lang="en-US" sz="1100" baseline="0" dirty="0">
-                          <a:latin typeface="Consolas" panose="020B0609020204030204" pitchFamily="49" charset="0"/>
-                        </a:rPr>
-                        <a:t>{</a:t>
-                      </a:r>
-                    </a:p>
-                    <a:p>
-                      <a:r>
-                        <a:rPr lang="en-US" sz="1100" baseline="0" dirty="0">
-                          <a:latin typeface="Consolas" panose="020B0609020204030204" pitchFamily="49" charset="0"/>
-                        </a:rPr>
-                        <a:t>    </a:t>
-                      </a:r>
-                      <a:r>
-                        <a:rPr lang="en-US" sz="1100" baseline="0" dirty="0">
-                          <a:solidFill>
-                            <a:srgbClr val="0000FF"/>
-                          </a:solidFill>
-                          <a:latin typeface="Consolas" panose="020B0609020204030204" pitchFamily="49" charset="0"/>
-                        </a:rPr>
-                        <a:t>public string </a:t>
-                      </a:r>
-                      <a:r>
-                        <a:rPr lang="en-US" sz="1100" baseline="0" dirty="0">
-                          <a:latin typeface="Consolas" panose="020B0609020204030204" pitchFamily="49" charset="0"/>
-                        </a:rPr>
-                        <a:t>Name { get; set; } = Name;</a:t>
-                      </a:r>
-                    </a:p>
-                    <a:p>
-                      <a:r>
-                        <a:rPr lang="en-US" sz="1100" baseline="0" dirty="0">
-                          <a:latin typeface="Consolas" panose="020B0609020204030204" pitchFamily="49" charset="0"/>
-                        </a:rPr>
-                        <a:t>    </a:t>
-                      </a:r>
-                      <a:r>
-                        <a:rPr lang="en-US" sz="1100" baseline="0" dirty="0">
-                          <a:solidFill>
-                            <a:srgbClr val="0000FF"/>
-                          </a:solidFill>
-                          <a:latin typeface="Consolas" panose="020B0609020204030204" pitchFamily="49" charset="0"/>
-                        </a:rPr>
-                        <a:t>public int </a:t>
-                      </a:r>
-                      <a:r>
-                        <a:rPr lang="en-US" sz="1100" baseline="0" dirty="0">
-                          <a:solidFill>
-                            <a:schemeClr val="tx1"/>
-                          </a:solidFill>
-                          <a:latin typeface="Consolas" panose="020B0609020204030204" pitchFamily="49" charset="0"/>
-                        </a:rPr>
-                        <a:t>Age</a:t>
-                      </a:r>
-                      <a:r>
-                        <a:rPr lang="en-US" sz="1100" baseline="0" dirty="0">
-                          <a:solidFill>
-                            <a:srgbClr val="0000FF"/>
-                          </a:solidFill>
+                        <a:t>Bassam Alugili</a:t>
+                      </a:r>
+                      <a:r>
+                        <a:rPr lang="en-US" sz="1050" baseline="0" dirty="0">
+                          <a:latin typeface="Consolas" panose="020B0609020204030204" pitchFamily="49" charset="0"/>
+                        </a:rPr>
+                        <a:t>", </a:t>
+                      </a:r>
+                      <a:r>
+                        <a:rPr lang="en-US" sz="1050" baseline="0" dirty="0">
+                          <a:solidFill>
+                            <a:srgbClr val="0000FF"/>
+                          </a:solidFill>
+                          <a:latin typeface="Consolas" panose="020B0609020204030204" pitchFamily="49" charset="0"/>
+                        </a:rPr>
+                        <a:t>42</a:t>
+                      </a:r>
+                      <a:r>
+                        <a:rPr lang="en-US" sz="1050" baseline="0" dirty="0">
+                          <a:latin typeface="Consolas" panose="020B0609020204030204" pitchFamily="49" charset="0"/>
+                        </a:rPr>
+                        <a:t>);</a:t>
+                      </a:r>
+                    </a:p>
+                    <a:p>
+                      <a:r>
+                        <a:rPr lang="en-US" sz="1050" baseline="0" dirty="0">
                           <a:latin typeface="Consolas" panose="020B0609020204030204" pitchFamily="49" charset="0"/>
                         </a:rPr>
                         <a:t> </a:t>
                       </a:r>
-                      <a:r>
-                        <a:rPr lang="en-US" sz="1100" baseline="0" dirty="0">
-                          <a:latin typeface="Consolas" panose="020B0609020204030204" pitchFamily="49" charset="0"/>
-                        </a:rPr>
-                        <a:t>{ get; set; } = Age;</a:t>
-                      </a:r>
-                    </a:p>
-                    <a:p>
-                      <a:r>
-                        <a:rPr lang="en-US" sz="1100" baseline="0" dirty="0">
-                          <a:latin typeface="Consolas" panose="020B0609020204030204" pitchFamily="49" charset="0"/>
-                        </a:rPr>
-                        <a:t>}</a:t>
-                      </a:r>
-                    </a:p>
-                    <a:p>
-                      <a:r>
-                        <a:rPr lang="en-US" sz="1100" baseline="0" dirty="0">
-                          <a:solidFill>
-                            <a:srgbClr val="0000FF"/>
-                          </a:solidFill>
-                          <a:latin typeface="Consolas" panose="020B0609020204030204" pitchFamily="49" charset="0"/>
-                        </a:rPr>
-                        <a:t>var</a:t>
-                      </a:r>
-                      <a:r>
-                        <a:rPr lang="en-US" sz="1100" baseline="0" dirty="0">
-                          <a:latin typeface="Consolas" panose="020B0609020204030204" pitchFamily="49" charset="0"/>
-                        </a:rPr>
-                        <a:t> person1 = </a:t>
-                      </a:r>
-                      <a:r>
-                        <a:rPr lang="en-US" sz="1100" baseline="0" dirty="0">
-                          <a:solidFill>
-                            <a:srgbClr val="0000FF"/>
-                          </a:solidFill>
-                          <a:latin typeface="Consolas" panose="020B0609020204030204" pitchFamily="49" charset="0"/>
-                        </a:rPr>
-                        <a:t>new</a:t>
-                      </a:r>
-                      <a:r>
-                        <a:rPr lang="en-US" sz="1100" baseline="0" dirty="0">
-                          <a:latin typeface="Consolas" panose="020B0609020204030204" pitchFamily="49" charset="0"/>
-                        </a:rPr>
-                        <a:t> Person("</a:t>
-                      </a:r>
-                      <a:r>
-                        <a:rPr lang="en-US" sz="1100" baseline="0" dirty="0">
-                          <a:solidFill>
-                            <a:schemeClr val="accent6">
-                              <a:lumMod val="75000"/>
-                            </a:schemeClr>
-                          </a:solidFill>
-                          <a:latin typeface="Consolas" panose="020B0609020204030204" pitchFamily="49" charset="0"/>
-                        </a:rPr>
-                        <a:t>Bassam Alugili</a:t>
-                      </a:r>
-                      <a:r>
-                        <a:rPr lang="en-US" sz="1100" baseline="0" dirty="0">
-                          <a:latin typeface="Consolas" panose="020B0609020204030204" pitchFamily="49" charset="0"/>
-                        </a:rPr>
-                        <a:t>",</a:t>
-                      </a:r>
-                      <a:r>
-                        <a:rPr lang="en-US" sz="1100" baseline="0" dirty="0">
-                          <a:solidFill>
-                            <a:srgbClr val="0000FF"/>
-                          </a:solidFill>
-                          <a:latin typeface="Consolas" panose="020B0609020204030204" pitchFamily="49" charset="0"/>
-                        </a:rPr>
-                        <a:t>42</a:t>
-                      </a:r>
-                      <a:r>
-                        <a:rPr lang="en-US" sz="1100" baseline="0" dirty="0">
-                          <a:latin typeface="Consolas" panose="020B0609020204030204" pitchFamily="49" charset="0"/>
-                        </a:rPr>
-                        <a:t> );</a:t>
-                      </a:r>
-                    </a:p>
-                    <a:p>
-                      <a:r>
-                        <a:rPr lang="en-US" sz="1100" baseline="0" dirty="0">
-                          <a:solidFill>
-                            <a:srgbClr val="0000FF"/>
-                          </a:solidFill>
-                          <a:latin typeface="Consolas" panose="020B0609020204030204" pitchFamily="49" charset="0"/>
-                        </a:rPr>
-                        <a:t>var</a:t>
-                      </a:r>
-                      <a:r>
-                        <a:rPr lang="en-US" sz="1100" baseline="0" dirty="0">
-                          <a:latin typeface="Consolas" panose="020B0609020204030204" pitchFamily="49" charset="0"/>
-                        </a:rPr>
-                        <a:t> person2 = </a:t>
-                      </a:r>
-                      <a:r>
-                        <a:rPr lang="en-US" sz="1100" baseline="0" dirty="0">
-                          <a:solidFill>
-                            <a:srgbClr val="0000FF"/>
-                          </a:solidFill>
-                          <a:latin typeface="Consolas" panose="020B0609020204030204" pitchFamily="49" charset="0"/>
-                        </a:rPr>
-                        <a:t>new</a:t>
-                      </a:r>
-                      <a:r>
-                        <a:rPr lang="en-US" sz="1100" baseline="0" dirty="0">
-                          <a:latin typeface="Consolas" panose="020B0609020204030204" pitchFamily="49" charset="0"/>
-                        </a:rPr>
-                        <a:t> Person("</a:t>
-                      </a:r>
-                      <a:r>
-                        <a:rPr lang="en-US" sz="1100" baseline="0" dirty="0">
-                          <a:solidFill>
-                            <a:schemeClr val="accent6">
-                              <a:lumMod val="75000"/>
-                            </a:schemeClr>
-                          </a:solidFill>
-                          <a:latin typeface="Consolas" panose="020B0609020204030204" pitchFamily="49" charset="0"/>
-                        </a:rPr>
-                        <a:t>Bassam Alugili</a:t>
-                      </a:r>
-                      <a:r>
-                        <a:rPr lang="en-US" sz="1100" baseline="0" dirty="0">
-                          <a:latin typeface="Consolas" panose="020B0609020204030204" pitchFamily="49" charset="0"/>
-                        </a:rPr>
-                        <a:t>",</a:t>
-                      </a:r>
-                      <a:r>
-                        <a:rPr lang="en-US" sz="1100" baseline="0" dirty="0">
-                          <a:solidFill>
-                            <a:srgbClr val="0000FF"/>
-                          </a:solidFill>
-                          <a:latin typeface="Consolas" panose="020B0609020204030204" pitchFamily="49" charset="0"/>
-                        </a:rPr>
-                        <a:t>42</a:t>
-                      </a:r>
-                      <a:r>
-                        <a:rPr lang="en-US" sz="1100" baseline="0" dirty="0">
-                          <a:latin typeface="Consolas" panose="020B0609020204030204" pitchFamily="49" charset="0"/>
-                        </a:rPr>
-                        <a:t>);</a:t>
-                      </a:r>
-                    </a:p>
-                    <a:p>
-                      <a:r>
-                        <a:rPr lang="en-US" sz="1100" baseline="0" dirty="0">
-                          <a:latin typeface="Consolas" panose="020B0609020204030204" pitchFamily="49" charset="0"/>
-                        </a:rPr>
-                        <a:t> </a:t>
-                      </a:r>
-                    </a:p>
-                    <a:p>
-                      <a:r>
-                        <a:rPr lang="en-US" sz="1100" baseline="0" dirty="0" err="1">
+                    </a:p>
+                    <a:p>
+                      <a:r>
+                        <a:rPr lang="en-US" sz="1050" baseline="0" dirty="0" err="1">
                           <a:latin typeface="Consolas" panose="020B0609020204030204" pitchFamily="49" charset="0"/>
                         </a:rPr>
                         <a:t>Console.WriteLine</a:t>
                       </a:r>
                       <a:r>
-                        <a:rPr lang="en-US" sz="1100" baseline="0" dirty="0">
+                        <a:rPr lang="en-US" sz="1050" baseline="0" dirty="0">
                           <a:latin typeface="Consolas" panose="020B0609020204030204" pitchFamily="49" charset="0"/>
                         </a:rPr>
                         <a:t>(person1 </a:t>
                       </a:r>
                       <a:r>
-                        <a:rPr lang="en-US" sz="1100" baseline="0" dirty="0">
+                        <a:rPr lang="en-US" sz="1050" baseline="0" dirty="0">
                           <a:solidFill>
                             <a:srgbClr val="0000FF"/>
                           </a:solidFill>
@@ -3793,17 +3827,15 @@
                         <a:t>==</a:t>
                       </a:r>
                       <a:r>
-                        <a:rPr lang="en-US" sz="1100" baseline="0" dirty="0">
+                        <a:rPr lang="en-US" sz="1050" baseline="0" dirty="0">
                           <a:latin typeface="Consolas" panose="020B0609020204030204" pitchFamily="49" charset="0"/>
                         </a:rPr>
                         <a:t> person2); </a:t>
                       </a:r>
                       <a:r>
-                        <a:rPr lang="en-US" sz="1100" baseline="0" dirty="0">
-                          <a:solidFill>
-                            <a:schemeClr val="accent6">
-                              <a:lumMod val="75000"/>
-                            </a:schemeClr>
+                        <a:rPr lang="en-US" sz="1050" baseline="0" dirty="0">
+                          <a:solidFill>
+                            <a:srgbClr val="23735D"/>
                           </a:solidFill>
                           <a:latin typeface="Consolas" panose="020B0609020204030204" pitchFamily="49" charset="0"/>
                         </a:rPr>
@@ -3812,23 +3844,21 @@
                     </a:p>
                     <a:p>
                       <a:r>
-                        <a:rPr lang="en-US" sz="1100" baseline="0" dirty="0" err="1">
+                        <a:rPr lang="en-US" sz="1050" baseline="0" dirty="0" err="1">
                           <a:latin typeface="Consolas" panose="020B0609020204030204" pitchFamily="49" charset="0"/>
                         </a:rPr>
                         <a:t>Console.WriteLine</a:t>
                       </a:r>
                       <a:r>
-                        <a:rPr lang="en-US" sz="1100" baseline="0" dirty="0">
+                        <a:rPr lang="en-US" sz="1050" baseline="0" dirty="0">
                           <a:latin typeface="Consolas" panose="020B0609020204030204" pitchFamily="49" charset="0"/>
                         </a:rPr>
                         <a:t>(person1.Equals(person2)); </a:t>
                       </a:r>
                       <a:r>
-                        <a:rPr lang="en-US" sz="1100" baseline="0" dirty="0">
-                          <a:solidFill>
-                            <a:schemeClr val="accent6">
-                              <a:lumMod val="75000"/>
-                            </a:schemeClr>
+                        <a:rPr lang="en-US" sz="1050" baseline="0" dirty="0">
+                          <a:solidFill>
+                            <a:srgbClr val="23735D"/>
                           </a:solidFill>
                           <a:latin typeface="Consolas" panose="020B0609020204030204" pitchFamily="49" charset="0"/>
                         </a:rPr>
@@ -3836,7 +3866,7 @@
                       </a:r>
                     </a:p>
                     <a:p>
-                      <a:endParaRPr lang="en-US" sz="1100" baseline="0" dirty="0">
+                      <a:endParaRPr lang="en-US" sz="1050" baseline="0" dirty="0">
                         <a:solidFill>
                           <a:schemeClr val="accent6">
                             <a:lumMod val="75000"/>
@@ -3847,11 +3877,9 @@
                     </a:p>
                     <a:p>
                       <a:r>
-                        <a:rPr lang="en-US" sz="1100" baseline="0" dirty="0">
-                          <a:solidFill>
-                            <a:schemeClr val="accent6">
-                              <a:lumMod val="75000"/>
-                            </a:schemeClr>
+                        <a:rPr lang="en-US" sz="1050" baseline="0" dirty="0">
+                          <a:solidFill>
+                            <a:srgbClr val="23735D"/>
                           </a:solidFill>
                           <a:latin typeface="Consolas" panose="020B0609020204030204" pitchFamily="49" charset="0"/>
                         </a:rPr>
@@ -3877,25 +3905,25 @@
                         <a:defRPr/>
                       </a:pPr>
                       <a:r>
-                        <a:rPr lang="en-US" sz="1100" baseline="0" dirty="0" err="1">
+                        <a:rPr lang="en-US" sz="1050" baseline="0" dirty="0" err="1">
                           <a:latin typeface="Consolas" panose="020B0609020204030204" pitchFamily="49" charset="0"/>
                         </a:rPr>
                         <a:t>Console.WriteLine</a:t>
                       </a:r>
                       <a:r>
-                        <a:rPr lang="en-US" sz="1100" baseline="0" dirty="0">
+                        <a:rPr lang="en-US" sz="1050" baseline="0" dirty="0">
                           <a:latin typeface="Consolas" panose="020B0609020204030204" pitchFamily="49" charset="0"/>
                         </a:rPr>
                         <a:t>(</a:t>
                       </a:r>
                       <a:r>
-                        <a:rPr lang="en-US" sz="1100" baseline="0" dirty="0" err="1">
+                        <a:rPr lang="en-US" sz="1050" baseline="0" dirty="0" err="1">
                           <a:latin typeface="Consolas" panose="020B0609020204030204" pitchFamily="49" charset="0"/>
                         </a:rPr>
                         <a:t>ReferenceEquals</a:t>
                       </a:r>
                       <a:r>
-                        <a:rPr lang="en-US" sz="1100" baseline="0" dirty="0">
+                        <a:rPr lang="en-US" sz="1050" baseline="0" dirty="0">
                           <a:latin typeface="Consolas" panose="020B0609020204030204" pitchFamily="49" charset="0"/>
                         </a:rPr>
                         <a:t>(person1, person2));</a:t>
@@ -3903,7 +3931,7 @@
                     </a:p>
                     <a:p>
                       <a:r>
-                        <a:rPr lang="en-US" sz="1100" baseline="0" dirty="0">
+                        <a:rPr lang="en-US" sz="1050" baseline="0" dirty="0">
                           <a:latin typeface="Consolas" panose="020B0609020204030204" pitchFamily="49" charset="0"/>
                         </a:rPr>
                         <a:t> </a:t>
@@ -3911,7 +3939,18 @@
                     </a:p>
                     <a:p>
                       <a:r>
-                        <a:rPr lang="en-US" sz="1100" baseline="0" dirty="0">
+                        <a:rPr lang="en-US" sz="1050" baseline="0" dirty="0">
+                          <a:solidFill>
+                            <a:srgbClr val="23735D"/>
+                          </a:solidFill>
+                          <a:latin typeface="Consolas" panose="020B0609020204030204" pitchFamily="49" charset="0"/>
+                        </a:rPr>
+                        <a:t>// Change the default record! --&gt; Create a new one!</a:t>
+                      </a:r>
+                    </a:p>
+                    <a:p>
+                      <a:r>
+                        <a:rPr lang="en-US" sz="1050" baseline="0" dirty="0">
                           <a:solidFill>
                             <a:srgbClr val="0000FF"/>
                           </a:solidFill>
@@ -3920,13 +3959,13 @@
                         <a:t>var</a:t>
                       </a:r>
                       <a:r>
-                        <a:rPr lang="en-US" sz="1100" baseline="0" dirty="0">
+                        <a:rPr lang="en-US" sz="1050" baseline="0" dirty="0">
                           <a:latin typeface="Consolas" panose="020B0609020204030204" pitchFamily="49" charset="0"/>
                         </a:rPr>
                         <a:t> person3 = person1 </a:t>
                       </a:r>
                       <a:r>
-                        <a:rPr lang="en-US" sz="1100" baseline="0" dirty="0">
+                        <a:rPr lang="en-US" sz="1050" baseline="0" dirty="0">
                           <a:solidFill>
                             <a:srgbClr val="0000FF"/>
                           </a:solidFill>
@@ -3935,13 +3974,13 @@
                         <a:t>with</a:t>
                       </a:r>
                       <a:r>
-                        <a:rPr lang="en-US" sz="1100" baseline="0" dirty="0">
+                        <a:rPr lang="en-US" sz="1050" baseline="0" dirty="0">
                           <a:latin typeface="Consolas" panose="020B0609020204030204" pitchFamily="49" charset="0"/>
                         </a:rPr>
                         <a:t> { Age = </a:t>
                       </a:r>
                       <a:r>
-                        <a:rPr lang="en-US" sz="1100" baseline="0" dirty="0">
+                        <a:rPr lang="en-US" sz="1050" baseline="0" dirty="0">
                           <a:solidFill>
                             <a:srgbClr val="0000FF"/>
                           </a:solidFill>
@@ -3950,177 +3989,566 @@
                         <a:t>43</a:t>
                       </a:r>
                       <a:r>
-                        <a:rPr lang="en-US" sz="1100" baseline="0" dirty="0">
+                        <a:rPr lang="en-US" sz="1050" baseline="0" dirty="0">
                           <a:latin typeface="Consolas" panose="020B0609020204030204" pitchFamily="49" charset="0"/>
                         </a:rPr>
                         <a:t> }; </a:t>
                       </a:r>
-                      <a:r>
-                        <a:rPr lang="en-US" sz="1100" baseline="0" dirty="0">
-                          <a:solidFill>
-                            <a:schemeClr val="accent6">
-                              <a:lumMod val="75000"/>
+                    </a:p>
+                    <a:p>
+                      <a:endParaRPr lang="en-US" sz="1050" baseline="0" dirty="0">
+                        <a:solidFill>
+                          <a:schemeClr val="accent6">
+                            <a:lumMod val="75000"/>
+                          </a:schemeClr>
+                        </a:solidFill>
+                        <a:latin typeface="Consolas" panose="020B0609020204030204" pitchFamily="49" charset="0"/>
+                      </a:endParaRPr>
+                    </a:p>
+                    <a:p>
+                      <a:r>
+                        <a:rPr lang="en-US" sz="1050" baseline="0" dirty="0" err="1">
+                          <a:latin typeface="Consolas" panose="020B0609020204030204" pitchFamily="49" charset="0"/>
+                        </a:rPr>
+                        <a:t>Console.WriteLine</a:t>
+                      </a:r>
+                      <a:r>
+                        <a:rPr lang="en-US" sz="1050" baseline="0" dirty="0">
+                          <a:latin typeface="Consolas" panose="020B0609020204030204" pitchFamily="49" charset="0"/>
+                        </a:rPr>
+                        <a:t>(person1 </a:t>
+                      </a:r>
+                      <a:r>
+                        <a:rPr lang="en-US" sz="1050" baseline="0" dirty="0">
+                          <a:solidFill>
+                            <a:srgbClr val="0000FF"/>
+                          </a:solidFill>
+                          <a:latin typeface="Consolas" panose="020B0609020204030204" pitchFamily="49" charset="0"/>
+                        </a:rPr>
+                        <a:t>==</a:t>
+                      </a:r>
+                      <a:r>
+                        <a:rPr lang="en-US" sz="1050" baseline="0" dirty="0">
+                          <a:latin typeface="Consolas" panose="020B0609020204030204" pitchFamily="49" charset="0"/>
+                        </a:rPr>
+                        <a:t> person3); </a:t>
+                      </a:r>
+                      <a:r>
+                        <a:rPr lang="en-US" sz="1050" baseline="0" dirty="0">
+                          <a:solidFill>
+                            <a:srgbClr val="23735D"/>
+                          </a:solidFill>
+                          <a:latin typeface="Consolas" panose="020B0609020204030204" pitchFamily="49" charset="0"/>
+                        </a:rPr>
+                        <a:t>// False; Structural equality.</a:t>
+                      </a:r>
+                    </a:p>
+                    <a:p>
+                      <a:pPr marL="0" marR="0" lvl="0" indent="0" algn="l" defTabSz="914400" rtl="0" eaLnBrk="1" fontAlgn="auto" latinLnBrk="0" hangingPunct="1">
+                        <a:lnSpc>
+                          <a:spcPct val="100000"/>
+                        </a:lnSpc>
+                        <a:spcBef>
+                          <a:spcPts val="0"/>
+                        </a:spcBef>
+                        <a:spcAft>
+                          <a:spcPts val="0"/>
+                        </a:spcAft>
+                        <a:buClrTx/>
+                        <a:buSzTx/>
+                        <a:buFontTx/>
+                        <a:buNone/>
+                        <a:tabLst/>
+                        <a:defRPr/>
+                      </a:pPr>
+                      <a:r>
+                        <a:rPr lang="en-US" sz="1050" baseline="0" dirty="0">
+                          <a:solidFill>
+                            <a:srgbClr val="0000FF"/>
+                          </a:solidFill>
+                          <a:latin typeface="Consolas" panose="020B0609020204030204" pitchFamily="49" charset="0"/>
+                        </a:rPr>
+                        <a:t>var</a:t>
+                      </a:r>
+                      <a:r>
+                        <a:rPr lang="en-US" sz="1050" baseline="0" dirty="0">
+                          <a:latin typeface="Consolas" panose="020B0609020204030204" pitchFamily="49" charset="0"/>
+                        </a:rPr>
+                        <a:t> (name, age) = person3; </a:t>
+                      </a:r>
+                      <a:r>
+                        <a:rPr lang="en-US" sz="1050" baseline="0" dirty="0">
+                          <a:solidFill>
+                            <a:srgbClr val="23735D"/>
+                          </a:solidFill>
+                          <a:latin typeface="Consolas" panose="020B0609020204030204" pitchFamily="49" charset="0"/>
+                        </a:rPr>
+                        <a:t>// Destruct a record.</a:t>
+                      </a:r>
+                    </a:p>
+                    <a:p>
+                      <a:r>
+                        <a:rPr lang="en-US" sz="1050" baseline="0" dirty="0">
+                          <a:latin typeface="Consolas" panose="020B0609020204030204" pitchFamily="49" charset="0"/>
+                        </a:rPr>
+                        <a:t> </a:t>
+                      </a:r>
+                    </a:p>
+                    <a:p>
+                      <a:r>
+                        <a:rPr lang="en-US" sz="1050" baseline="0" dirty="0">
+                          <a:solidFill>
+                            <a:srgbClr val="23735D"/>
+                          </a:solidFill>
+                          <a:latin typeface="Consolas" panose="020B0609020204030204" pitchFamily="49" charset="0"/>
+                        </a:rPr>
+                        <a:t>// Change the Mutable Record.</a:t>
+                      </a:r>
+                    </a:p>
+                    <a:p>
+                      <a:r>
+                        <a:rPr lang="en-US" sz="1050" baseline="0" dirty="0">
+                          <a:latin typeface="Consolas" panose="020B0609020204030204" pitchFamily="49" charset="0"/>
+                        </a:rPr>
+                        <a:t>person1.Age = </a:t>
+                      </a:r>
+                      <a:r>
+                        <a:rPr lang="en-US" sz="1050" baseline="0" dirty="0">
+                          <a:solidFill>
+                            <a:srgbClr val="0000FF"/>
+                          </a:solidFill>
+                          <a:latin typeface="Consolas" panose="020B0609020204030204" pitchFamily="49" charset="0"/>
+                        </a:rPr>
+                        <a:t>43</a:t>
+                      </a:r>
+                      <a:r>
+                        <a:rPr lang="en-US" sz="1050" baseline="0" dirty="0">
+                          <a:latin typeface="Consolas" panose="020B0609020204030204" pitchFamily="49" charset="0"/>
+                        </a:rPr>
+                        <a:t>;</a:t>
+                      </a:r>
+                    </a:p>
+                    <a:p>
+                      <a:endParaRPr lang="en-US" sz="1200" b="1" dirty="0"/>
+                    </a:p>
+                    <a:p>
+                      <a:r>
+                        <a:rPr lang="en-US" sz="1200" b="1" dirty="0"/>
+                        <a:t>Inheritance:</a:t>
+                      </a:r>
+                    </a:p>
+                    <a:p>
+                      <a:r>
+                        <a:rPr lang="en-US" sz="1000" kern="1200" dirty="0">
+                          <a:solidFill>
+                            <a:srgbClr val="0000FF"/>
+                          </a:solidFill>
+                          <a:latin typeface="Consolas" panose="020B0609020204030204" pitchFamily="49" charset="0"/>
+                          <a:ea typeface="+mn-ea"/>
+                          <a:cs typeface="+mn-cs"/>
+                        </a:rPr>
+                        <a:t>public</a:t>
+                      </a:r>
+                      <a:r>
+                        <a:rPr lang="en-US" sz="1000" kern="1200" dirty="0">
+                          <a:solidFill>
+                            <a:schemeClr val="dk1"/>
+                          </a:solidFill>
+                          <a:latin typeface="Consolas" panose="020B0609020204030204" pitchFamily="49" charset="0"/>
+                          <a:ea typeface="+mn-ea"/>
+                          <a:cs typeface="+mn-cs"/>
+                        </a:rPr>
+                        <a:t> </a:t>
+                      </a:r>
+                      <a:r>
+                        <a:rPr lang="en-US" sz="1000" kern="1200" dirty="0">
+                          <a:solidFill>
+                            <a:srgbClr val="0000FF"/>
+                          </a:solidFill>
+                          <a:latin typeface="Consolas" panose="020B0609020204030204" pitchFamily="49" charset="0"/>
+                          <a:ea typeface="+mn-ea"/>
+                          <a:cs typeface="+mn-cs"/>
+                        </a:rPr>
+                        <a:t>record</a:t>
+                      </a:r>
+                      <a:r>
+                        <a:rPr lang="en-US" sz="1000" kern="1200" dirty="0">
+                          <a:solidFill>
+                            <a:schemeClr val="dk1"/>
+                          </a:solidFill>
+                          <a:latin typeface="Consolas" panose="020B0609020204030204" pitchFamily="49" charset="0"/>
+                          <a:ea typeface="+mn-ea"/>
+                          <a:cs typeface="+mn-cs"/>
+                        </a:rPr>
+                        <a:t> </a:t>
+                      </a:r>
+                      <a:r>
+                        <a:rPr lang="en-US" sz="1000" kern="1200" dirty="0" err="1">
+                          <a:solidFill>
+                            <a:schemeClr val="bg2">
+                              <a:lumMod val="50000"/>
                             </a:schemeClr>
                           </a:solidFill>
                           <a:latin typeface="Consolas" panose="020B0609020204030204" pitchFamily="49" charset="0"/>
-                        </a:rPr>
-                        <a:t>// Change the default record! --&gt; Create a new one!</a:t>
-                      </a:r>
-                    </a:p>
-                    <a:p>
-                      <a:r>
-                        <a:rPr lang="en-US" sz="1100" baseline="0" dirty="0" err="1">
-                          <a:latin typeface="Consolas" panose="020B0609020204030204" pitchFamily="49" charset="0"/>
+                          <a:ea typeface="+mn-ea"/>
+                          <a:cs typeface="+mn-cs"/>
+                        </a:rPr>
+                        <a:t>PersonInheritance</a:t>
+                      </a:r>
+                      <a:r>
+                        <a:rPr lang="en-US" sz="1000" kern="1200" dirty="0">
+                          <a:solidFill>
+                            <a:schemeClr val="dk1"/>
+                          </a:solidFill>
+                          <a:latin typeface="Consolas" panose="020B0609020204030204" pitchFamily="49" charset="0"/>
+                          <a:ea typeface="+mn-ea"/>
+                          <a:cs typeface="+mn-cs"/>
+                        </a:rPr>
+                        <a:t>(</a:t>
+                      </a:r>
+                      <a:r>
+                        <a:rPr lang="en-US" sz="1000" kern="1200" dirty="0">
+                          <a:solidFill>
+                            <a:srgbClr val="0000FF"/>
+                          </a:solidFill>
+                          <a:latin typeface="Consolas" panose="020B0609020204030204" pitchFamily="49" charset="0"/>
+                          <a:ea typeface="+mn-ea"/>
+                          <a:cs typeface="+mn-cs"/>
+                        </a:rPr>
+                        <a:t>string</a:t>
+                      </a:r>
+                      <a:r>
+                        <a:rPr lang="en-US" sz="1000" kern="1200" dirty="0">
+                          <a:solidFill>
+                            <a:schemeClr val="dk1"/>
+                          </a:solidFill>
+                          <a:latin typeface="Consolas" panose="020B0609020204030204" pitchFamily="49" charset="0"/>
+                          <a:ea typeface="+mn-ea"/>
+                          <a:cs typeface="+mn-cs"/>
+                        </a:rPr>
+                        <a:t> Name, </a:t>
+                      </a:r>
+                      <a:r>
+                        <a:rPr lang="en-US" sz="1000" kern="1200" dirty="0">
+                          <a:solidFill>
+                            <a:srgbClr val="0000FF"/>
+                          </a:solidFill>
+                          <a:latin typeface="Consolas" panose="020B0609020204030204" pitchFamily="49" charset="0"/>
+                          <a:ea typeface="+mn-ea"/>
+                          <a:cs typeface="+mn-cs"/>
+                        </a:rPr>
+                        <a:t>int</a:t>
+                      </a:r>
+                      <a:r>
+                        <a:rPr lang="en-US" sz="1000" kern="1200" dirty="0">
+                          <a:solidFill>
+                            <a:schemeClr val="dk1"/>
+                          </a:solidFill>
+                          <a:latin typeface="Consolas" panose="020B0609020204030204" pitchFamily="49" charset="0"/>
+                          <a:ea typeface="+mn-ea"/>
+                          <a:cs typeface="+mn-cs"/>
+                        </a:rPr>
+                        <a:t> Age, </a:t>
+                      </a:r>
+                      <a:r>
+                        <a:rPr lang="en-US" sz="1000" kern="1200" dirty="0">
+                          <a:solidFill>
+                            <a:srgbClr val="0000FF"/>
+                          </a:solidFill>
+                          <a:latin typeface="Consolas" panose="020B0609020204030204" pitchFamily="49" charset="0"/>
+                          <a:ea typeface="+mn-ea"/>
+                          <a:cs typeface="+mn-cs"/>
+                        </a:rPr>
+                        <a:t>string</a:t>
+                      </a:r>
+                      <a:r>
+                        <a:rPr lang="en-US" sz="1000" kern="1200" dirty="0">
+                          <a:solidFill>
+                            <a:schemeClr val="dk1"/>
+                          </a:solidFill>
+                          <a:latin typeface="Consolas" panose="020B0609020204030204" pitchFamily="49" charset="0"/>
+                          <a:ea typeface="+mn-ea"/>
+                          <a:cs typeface="+mn-cs"/>
+                        </a:rPr>
+                        <a:t> Country):</a:t>
+                      </a:r>
+                      <a:r>
+                        <a:rPr lang="en-US" sz="1000" kern="1200" dirty="0">
+                          <a:solidFill>
+                            <a:schemeClr val="accent4">
+                              <a:lumMod val="50000"/>
+                            </a:schemeClr>
+                          </a:solidFill>
+                          <a:latin typeface="Consolas" panose="020B0609020204030204" pitchFamily="49" charset="0"/>
+                          <a:ea typeface="+mn-ea"/>
+                          <a:cs typeface="+mn-cs"/>
+                        </a:rPr>
+                        <a:t>Person</a:t>
+                      </a:r>
+                      <a:r>
+                        <a:rPr lang="en-US" sz="1000" kern="1200" dirty="0">
+                          <a:solidFill>
+                            <a:schemeClr val="dk1"/>
+                          </a:solidFill>
+                          <a:latin typeface="Consolas" panose="020B0609020204030204" pitchFamily="49" charset="0"/>
+                          <a:ea typeface="+mn-ea"/>
+                          <a:cs typeface="+mn-cs"/>
+                        </a:rPr>
+                        <a:t>(Name, Age);</a:t>
+                      </a:r>
+                    </a:p>
+                    <a:p>
+                      <a:r>
+                        <a:rPr lang="en-US" sz="1000" kern="1200" dirty="0">
+                          <a:solidFill>
+                            <a:srgbClr val="0000FF"/>
+                          </a:solidFill>
+                          <a:latin typeface="Consolas" panose="020B0609020204030204" pitchFamily="49" charset="0"/>
+                          <a:ea typeface="+mn-ea"/>
+                          <a:cs typeface="+mn-cs"/>
+                        </a:rPr>
+                        <a:t>var</a:t>
+                      </a:r>
+                      <a:r>
+                        <a:rPr lang="en-US" sz="1000" kern="1200" dirty="0">
+                          <a:solidFill>
+                            <a:schemeClr val="dk1"/>
+                          </a:solidFill>
+                          <a:latin typeface="Consolas" panose="020B0609020204030204" pitchFamily="49" charset="0"/>
+                          <a:ea typeface="+mn-ea"/>
+                          <a:cs typeface="+mn-cs"/>
+                        </a:rPr>
+                        <a:t> </a:t>
+                      </a:r>
+                      <a:r>
+                        <a:rPr lang="en-US" sz="1000" kern="1200" dirty="0" err="1">
+                          <a:solidFill>
+                            <a:schemeClr val="dk1"/>
+                          </a:solidFill>
+                          <a:latin typeface="Consolas" panose="020B0609020204030204" pitchFamily="49" charset="0"/>
+                          <a:ea typeface="+mn-ea"/>
+                          <a:cs typeface="+mn-cs"/>
+                        </a:rPr>
+                        <a:t>personInherited</a:t>
+                      </a:r>
+                      <a:r>
+                        <a:rPr lang="en-US" sz="1000" kern="1200" dirty="0">
+                          <a:solidFill>
+                            <a:schemeClr val="dk1"/>
+                          </a:solidFill>
+                          <a:latin typeface="Consolas" panose="020B0609020204030204" pitchFamily="49" charset="0"/>
+                          <a:ea typeface="+mn-ea"/>
+                          <a:cs typeface="+mn-cs"/>
+                        </a:rPr>
+                        <a:t> = </a:t>
+                      </a:r>
+                      <a:r>
+                        <a:rPr lang="en-US" sz="1000" kern="1200" dirty="0">
+                          <a:solidFill>
+                            <a:srgbClr val="0000FF"/>
+                          </a:solidFill>
+                          <a:latin typeface="Consolas" panose="020B0609020204030204" pitchFamily="49" charset="0"/>
+                          <a:ea typeface="+mn-ea"/>
+                          <a:cs typeface="+mn-cs"/>
+                        </a:rPr>
+                        <a:t>new</a:t>
+                      </a:r>
+                      <a:r>
+                        <a:rPr lang="en-US" sz="1000" kern="1200" dirty="0">
+                          <a:solidFill>
+                            <a:schemeClr val="dk1"/>
+                          </a:solidFill>
+                          <a:latin typeface="Consolas" panose="020B0609020204030204" pitchFamily="49" charset="0"/>
+                          <a:ea typeface="+mn-ea"/>
+                          <a:cs typeface="+mn-cs"/>
+                        </a:rPr>
+                        <a:t> </a:t>
+                      </a:r>
+                      <a:r>
+                        <a:rPr lang="en-US" sz="1000" kern="1200" dirty="0" err="1">
+                          <a:solidFill>
+                            <a:schemeClr val="bg2">
+                              <a:lumMod val="50000"/>
+                            </a:schemeClr>
+                          </a:solidFill>
+                          <a:latin typeface="Consolas" panose="020B0609020204030204" pitchFamily="49" charset="0"/>
+                          <a:ea typeface="+mn-ea"/>
+                          <a:cs typeface="+mn-cs"/>
+                        </a:rPr>
+                        <a:t>PersonInheritance</a:t>
+                      </a:r>
+                      <a:r>
+                        <a:rPr lang="en-US" sz="1000" kern="1200" dirty="0">
+                          <a:solidFill>
+                            <a:schemeClr val="dk1"/>
+                          </a:solidFill>
+                          <a:latin typeface="Consolas" panose="020B0609020204030204" pitchFamily="49" charset="0"/>
+                          <a:ea typeface="+mn-ea"/>
+                          <a:cs typeface="+mn-cs"/>
+                        </a:rPr>
+                        <a:t>("</a:t>
+                      </a:r>
+                      <a:r>
+                        <a:rPr lang="en-US" sz="1000" kern="1200" dirty="0">
+                          <a:solidFill>
+                            <a:srgbClr val="C00000"/>
+                          </a:solidFill>
+                          <a:latin typeface="Consolas" panose="020B0609020204030204" pitchFamily="49" charset="0"/>
+                          <a:ea typeface="+mn-ea"/>
+                          <a:cs typeface="+mn-cs"/>
+                        </a:rPr>
+                        <a:t>Bassam Alugili</a:t>
+                      </a:r>
+                      <a:r>
+                        <a:rPr lang="en-US" sz="1000" kern="1200" dirty="0">
+                          <a:solidFill>
+                            <a:schemeClr val="dk1"/>
+                          </a:solidFill>
+                          <a:latin typeface="Consolas" panose="020B0609020204030204" pitchFamily="49" charset="0"/>
+                          <a:ea typeface="+mn-ea"/>
+                          <a:cs typeface="+mn-cs"/>
+                        </a:rPr>
+                        <a:t>", </a:t>
+                      </a:r>
+                      <a:r>
+                        <a:rPr lang="en-US" sz="1000" kern="1200" dirty="0">
+                          <a:solidFill>
+                            <a:srgbClr val="0000FF"/>
+                          </a:solidFill>
+                          <a:latin typeface="Consolas" panose="020B0609020204030204" pitchFamily="49" charset="0"/>
+                          <a:ea typeface="+mn-ea"/>
+                          <a:cs typeface="+mn-cs"/>
+                        </a:rPr>
+                        <a:t>42</a:t>
+                      </a:r>
+                      <a:r>
+                        <a:rPr lang="en-US" sz="1000" kern="1200" dirty="0">
+                          <a:solidFill>
+                            <a:schemeClr val="dk1"/>
+                          </a:solidFill>
+                          <a:latin typeface="Consolas" panose="020B0609020204030204" pitchFamily="49" charset="0"/>
+                          <a:ea typeface="+mn-ea"/>
+                          <a:cs typeface="+mn-cs"/>
+                        </a:rPr>
+                        <a:t>, "</a:t>
+                      </a:r>
+                      <a:r>
+                        <a:rPr lang="en-US" sz="1000" kern="1200" dirty="0">
+                          <a:solidFill>
+                            <a:srgbClr val="C00000"/>
+                          </a:solidFill>
+                          <a:latin typeface="Consolas" panose="020B0609020204030204" pitchFamily="49" charset="0"/>
+                          <a:ea typeface="+mn-ea"/>
+                          <a:cs typeface="+mn-cs"/>
+                        </a:rPr>
+                        <a:t>Germany</a:t>
+                      </a:r>
+                      <a:r>
+                        <a:rPr lang="en-US" sz="1000" kern="1200" dirty="0">
+                          <a:solidFill>
+                            <a:schemeClr val="dk1"/>
+                          </a:solidFill>
+                          <a:latin typeface="Consolas" panose="020B0609020204030204" pitchFamily="49" charset="0"/>
+                          <a:ea typeface="+mn-ea"/>
+                          <a:cs typeface="+mn-cs"/>
+                        </a:rPr>
+                        <a:t>");</a:t>
+                      </a:r>
+                    </a:p>
+                    <a:p>
+                      <a:endParaRPr lang="en-US" sz="1000" kern="1200" dirty="0">
+                        <a:solidFill>
+                          <a:schemeClr val="dk1"/>
+                        </a:solidFill>
+                        <a:latin typeface="Consolas" panose="020B0609020204030204" pitchFamily="49" charset="0"/>
+                        <a:ea typeface="+mn-ea"/>
+                        <a:cs typeface="+mn-cs"/>
+                      </a:endParaRPr>
+                    </a:p>
+                    <a:p>
+                      <a:r>
+                        <a:rPr lang="en-US" sz="1000" kern="1200" dirty="0" err="1">
+                          <a:solidFill>
+                            <a:schemeClr val="dk1"/>
+                          </a:solidFill>
+                          <a:latin typeface="Consolas" panose="020B0609020204030204" pitchFamily="49" charset="0"/>
+                          <a:ea typeface="+mn-ea"/>
+                          <a:cs typeface="+mn-cs"/>
                         </a:rPr>
                         <a:t>Console.WriteLine</a:t>
                       </a:r>
                       <a:r>
-                        <a:rPr lang="en-US" sz="1100" baseline="0" dirty="0">
-                          <a:latin typeface="Consolas" panose="020B0609020204030204" pitchFamily="49" charset="0"/>
+                        <a:rPr lang="en-US" sz="1000" kern="1200" dirty="0">
+                          <a:solidFill>
+                            <a:schemeClr val="dk1"/>
+                          </a:solidFill>
+                          <a:latin typeface="Consolas" panose="020B0609020204030204" pitchFamily="49" charset="0"/>
+                          <a:ea typeface="+mn-ea"/>
+                          <a:cs typeface="+mn-cs"/>
                         </a:rPr>
                         <a:t>(person1 </a:t>
                       </a:r>
                       <a:r>
-                        <a:rPr lang="en-US" sz="1100" baseline="0" dirty="0">
-                          <a:solidFill>
-                            <a:srgbClr val="0000FF"/>
-                          </a:solidFill>
-                          <a:latin typeface="Consolas" panose="020B0609020204030204" pitchFamily="49" charset="0"/>
+                        <a:rPr lang="en-US" sz="1000" kern="1200" dirty="0">
+                          <a:solidFill>
+                            <a:srgbClr val="0000FF"/>
+                          </a:solidFill>
+                          <a:latin typeface="Consolas" panose="020B0609020204030204" pitchFamily="49" charset="0"/>
+                          <a:ea typeface="+mn-ea"/>
+                          <a:cs typeface="+mn-cs"/>
                         </a:rPr>
                         <a:t>==</a:t>
                       </a:r>
                       <a:r>
-                        <a:rPr lang="en-US" sz="1100" baseline="0" dirty="0">
-                          <a:latin typeface="Consolas" panose="020B0609020204030204" pitchFamily="49" charset="0"/>
-                        </a:rPr>
-                        <a:t> person3); </a:t>
-                      </a:r>
-                      <a:r>
-                        <a:rPr lang="en-US" sz="1100" baseline="0" dirty="0">
-                          <a:solidFill>
-                            <a:schemeClr val="accent6">
-                              <a:lumMod val="75000"/>
-                            </a:schemeClr>
-                          </a:solidFill>
-                          <a:latin typeface="Consolas" panose="020B0609020204030204" pitchFamily="49" charset="0"/>
-                        </a:rPr>
-                        <a:t>// False; Structural equality.</a:t>
-                      </a:r>
-                    </a:p>
-                    <a:p>
-                      <a:r>
-                        <a:rPr lang="en-US" sz="1100" baseline="0" dirty="0">
-                          <a:latin typeface="Consolas" panose="020B0609020204030204" pitchFamily="49" charset="0"/>
+                        <a:rPr lang="en-US" sz="1000" kern="1200" dirty="0">
+                          <a:solidFill>
+                            <a:schemeClr val="dk1"/>
+                          </a:solidFill>
+                          <a:latin typeface="Consolas" panose="020B0609020204030204" pitchFamily="49" charset="0"/>
+                          <a:ea typeface="+mn-ea"/>
+                          <a:cs typeface="+mn-cs"/>
                         </a:rPr>
                         <a:t> </a:t>
                       </a:r>
-                    </a:p>
-                    <a:p>
-                      <a:r>
-                        <a:rPr lang="en-US" sz="1100" baseline="0" dirty="0">
-                          <a:solidFill>
-                            <a:schemeClr val="accent6">
-                              <a:lumMod val="75000"/>
-                            </a:schemeClr>
-                          </a:solidFill>
-                          <a:latin typeface="Consolas" panose="020B0609020204030204" pitchFamily="49" charset="0"/>
-                        </a:rPr>
-                        <a:t>// Change the mutable record.</a:t>
-                      </a:r>
-                    </a:p>
-                    <a:p>
-                      <a:r>
-                        <a:rPr lang="en-US" sz="1100" baseline="0" dirty="0">
-                          <a:latin typeface="Consolas" panose="020B0609020204030204" pitchFamily="49" charset="0"/>
-                        </a:rPr>
-                        <a:t>person1.Age = </a:t>
-                      </a:r>
-                      <a:r>
-                        <a:rPr lang="en-US" sz="1100" baseline="0" dirty="0">
-                          <a:solidFill>
-                            <a:srgbClr val="0000FF"/>
-                          </a:solidFill>
-                          <a:latin typeface="Consolas" panose="020B0609020204030204" pitchFamily="49" charset="0"/>
-                        </a:rPr>
-                        <a:t>43</a:t>
-                      </a:r>
-                      <a:r>
-                        <a:rPr lang="en-US" sz="1100" baseline="0" dirty="0">
-                          <a:latin typeface="Consolas" panose="020B0609020204030204" pitchFamily="49" charset="0"/>
-                        </a:rPr>
-                        <a:t>;</a:t>
-                      </a:r>
-                    </a:p>
-                    <a:p>
-                      <a:r>
-                        <a:rPr lang="en-US" sz="1100" baseline="0" dirty="0">
-                          <a:solidFill>
-                            <a:srgbClr val="0000FF"/>
-                          </a:solidFill>
-                          <a:latin typeface="Consolas" panose="020B0609020204030204" pitchFamily="49" charset="0"/>
-                        </a:rPr>
-                        <a:t>var</a:t>
-                      </a:r>
-                      <a:r>
-                        <a:rPr lang="en-US" sz="1100" baseline="0" dirty="0">
-                          <a:latin typeface="Consolas" panose="020B0609020204030204" pitchFamily="49" charset="0"/>
-                        </a:rPr>
-                        <a:t> (name, age) = person3; </a:t>
-                      </a:r>
-                      <a:r>
-                        <a:rPr lang="en-US" sz="1100" baseline="0" dirty="0">
-                          <a:solidFill>
-                            <a:schemeClr val="accent6">
-                              <a:lumMod val="75000"/>
-                            </a:schemeClr>
-                          </a:solidFill>
-                          <a:latin typeface="Consolas" panose="020B0609020204030204" pitchFamily="49" charset="0"/>
-                        </a:rPr>
-                        <a:t>// Destruct a record.</a:t>
-                      </a:r>
-                    </a:p>
-                    <a:p>
-                      <a:r>
-                        <a:rPr lang="en-US" sz="1200" baseline="0" dirty="0"/>
-                        <a:t> </a:t>
-                      </a:r>
-                    </a:p>
-                    <a:p>
-                      <a:r>
-                        <a:rPr lang="en-US" sz="1200" b="1" baseline="0" dirty="0"/>
-                        <a:t>Pros:</a:t>
-                      </a:r>
-                    </a:p>
-                    <a:p>
-                      <a:r>
-                        <a:rPr lang="en-US" sz="1200" baseline="0" dirty="0"/>
-                        <a:t>Records are a lightweight type that can remove a lot of code.</a:t>
-                      </a:r>
-                    </a:p>
-                    <a:p>
-                      <a:r>
-                        <a:rPr lang="en-US" sz="1200" baseline="0" dirty="0"/>
-                        <a:t>Structural equality and Referential equality.</a:t>
-                      </a:r>
-                    </a:p>
-                    <a:p>
-                      <a:r>
-                        <a:rPr lang="en-US" sz="1200" baseline="0" dirty="0"/>
-                        <a:t> </a:t>
-                      </a:r>
-                    </a:p>
-                    <a:p>
-                      <a:r>
-                        <a:rPr lang="en-US" sz="1200" b="1" baseline="0" dirty="0"/>
-                        <a:t>Cons:</a:t>
-                      </a:r>
-                    </a:p>
-                    <a:p>
-                      <a:r>
-                        <a:rPr lang="en-US" sz="1200" baseline="0" dirty="0"/>
-                        <a:t>Allocating a lot of objects.</a:t>
-                      </a:r>
-                      <a:endParaRPr lang="de-DE" sz="1200" dirty="0"/>
+                      <a:r>
+                        <a:rPr lang="en-US" sz="1000" kern="1200" dirty="0" err="1">
+                          <a:solidFill>
+                            <a:schemeClr val="dk1"/>
+                          </a:solidFill>
+                          <a:latin typeface="Consolas" panose="020B0609020204030204" pitchFamily="49" charset="0"/>
+                          <a:ea typeface="+mn-ea"/>
+                          <a:cs typeface="+mn-cs"/>
+                        </a:rPr>
+                        <a:t>personInherited</a:t>
+                      </a:r>
+                      <a:r>
+                        <a:rPr lang="en-US" sz="1000" kern="1200" dirty="0">
+                          <a:solidFill>
+                            <a:schemeClr val="dk1"/>
+                          </a:solidFill>
+                          <a:latin typeface="Consolas" panose="020B0609020204030204" pitchFamily="49" charset="0"/>
+                          <a:ea typeface="+mn-ea"/>
+                          <a:cs typeface="+mn-cs"/>
+                        </a:rPr>
+                        <a:t>); </a:t>
+                      </a:r>
+                      <a:r>
+                        <a:rPr lang="en-US" sz="1000" kern="1200" dirty="0">
+                          <a:solidFill>
+                            <a:srgbClr val="23735D"/>
+                          </a:solidFill>
+                          <a:latin typeface="Consolas" panose="020B0609020204030204" pitchFamily="49" charset="0"/>
+                          <a:ea typeface="+mn-ea"/>
+                          <a:cs typeface="+mn-cs"/>
+                        </a:rPr>
+                        <a:t>// False; Type check! not equal.</a:t>
+                      </a:r>
+                      <a:endParaRPr lang="en-US" sz="1000" b="1" dirty="0">
+                        <a:solidFill>
+                          <a:srgbClr val="23735D"/>
+                        </a:solidFill>
+                        <a:latin typeface="Consolas" panose="020B0609020204030204" pitchFamily="49" charset="0"/>
+                      </a:endParaRPr>
                     </a:p>
                   </a:txBody>
                   <a:tcPr>
@@ -4153,8 +4581,8 @@
         </p:nvSpPr>
         <p:spPr>
           <a:xfrm>
-            <a:off x="186430" y="3537232"/>
-            <a:ext cx="6094602" cy="1446550"/>
+            <a:off x="7152247" y="2174450"/>
+            <a:ext cx="4706674" cy="1169551"/>
           </a:xfrm>
           <a:prstGeom prst="rect">
             <a:avLst/>
@@ -4168,7 +4596,7 @@
           <a:lstStyle/>
           <a:p>
             <a:r>
-              <a:rPr lang="en-US" sz="8800" dirty="0">
+              <a:rPr lang="en-US" sz="7000" dirty="0">
                 <a:ln w="0"/>
                 <a:solidFill>
                   <a:schemeClr val="accent1"/>
@@ -4184,7 +4612,7 @@
               <a:t>C</a:t>
             </a:r>
             <a:r>
-              <a:rPr lang="en-US" sz="8800" b="0" cap="none" spc="0" dirty="0">
+              <a:rPr lang="en-US" sz="7000" b="0" cap="none" spc="0" dirty="0">
                 <a:ln w="0"/>
                 <a:solidFill>
                   <a:schemeClr val="accent1"/>
@@ -4200,7 +4628,7 @@
               <a:t>heat </a:t>
             </a:r>
             <a:r>
-              <a:rPr lang="en-US" sz="8800" dirty="0">
+              <a:rPr lang="en-US" sz="7000" dirty="0">
                 <a:ln w="0"/>
                 <a:solidFill>
                   <a:schemeClr val="accent1"/>
@@ -4216,7 +4644,7 @@
               <a:t>S</a:t>
             </a:r>
             <a:r>
-              <a:rPr lang="en-US" sz="8800" b="0" cap="none" spc="0" dirty="0">
+              <a:rPr lang="en-US" sz="7000" b="0" cap="none" spc="0" dirty="0">
                 <a:ln w="0"/>
                 <a:solidFill>
                   <a:schemeClr val="accent1"/>
@@ -4231,7 +4659,7 @@
               </a:rPr>
               <a:t>heet </a:t>
             </a:r>
-            <a:endParaRPr lang="en-US" sz="8800" dirty="0"/>
+            <a:endParaRPr lang="en-US" sz="7000" dirty="0"/>
           </a:p>
         </p:txBody>
       </p:sp>
@@ -4249,7 +4677,7 @@
         </p:nvSpPr>
         <p:spPr>
           <a:xfrm>
-            <a:off x="752350" y="5075996"/>
+            <a:off x="7162343" y="3349691"/>
             <a:ext cx="4777730" cy="584775"/>
           </a:xfrm>
           <a:prstGeom prst="rect">
@@ -4268,7 +4696,7 @@
                 <a:solidFill>
                   <a:srgbClr val="0000FF"/>
                 </a:solidFill>
-                <a:hlinkClick r:id="rId3">
+                <a:hlinkClick r:id="rId2">
                   <a:extLst>
                     <a:ext uri="{A12FA001-AC4F-418D-AE19-62706E023703}">
                       <ahyp:hlinkClr xmlns:ahyp="http://schemas.microsoft.com/office/drawing/2018/hyperlinkcolor" val="tx"/>
@@ -4303,8 +4731,8 @@
         </p:nvSpPr>
         <p:spPr>
           <a:xfrm>
-            <a:off x="1831869" y="6027918"/>
-            <a:ext cx="2654114" cy="584775"/>
+            <a:off x="8853856" y="3934466"/>
+            <a:ext cx="1415427" cy="400110"/>
           </a:xfrm>
           <a:prstGeom prst="rect">
             <a:avLst/>
@@ -4318,7 +4746,7 @@
           <a:lstStyle/>
           <a:p>
             <a:r>
-              <a:rPr lang="en-US" sz="3200" dirty="0">
+              <a:rPr lang="en-US" sz="2000" dirty="0">
                 <a:solidFill>
                   <a:srgbClr val="0000FF"/>
                 </a:solidFill>
@@ -4343,14 +4771,14 @@
           <p:nvPr/>
         </p:nvPicPr>
         <p:blipFill>
-          <a:blip r:embed="rId4"/>
+          <a:blip r:embed="rId3"/>
           <a:stretch>
             <a:fillRect/>
           </a:stretch>
         </p:blipFill>
         <p:spPr>
           <a:xfrm>
-            <a:off x="389748" y="615820"/>
+            <a:off x="6792214" y="141653"/>
             <a:ext cx="5231837" cy="2268269"/>
           </a:xfrm>
           <a:prstGeom prst="rect">
@@ -4358,6 +4786,152 @@
           </a:prstGeom>
         </p:spPr>
       </p:pic>
+      <p:graphicFrame>
+        <p:nvGraphicFramePr>
+          <p:cNvPr id="18" name="Table 17">
+            <a:extLst>
+              <a:ext uri="{FF2B5EF4-FFF2-40B4-BE49-F238E27FC236}">
+                <a16:creationId xmlns:a16="http://schemas.microsoft.com/office/drawing/2014/main" id="{D26AB2D2-0B76-4055-BA8D-30B0D513E1C2}"/>
+              </a:ext>
+            </a:extLst>
+          </p:cNvPr>
+          <p:cNvGraphicFramePr>
+            <a:graphicFrameLocks noGrp="1"/>
+          </p:cNvGraphicFramePr>
+          <p:nvPr>
+            <p:extLst>
+              <p:ext uri="{D42A27DB-BD31-4B8C-83A1-F6EECF244321}">
+                <p14:modId xmlns:p14="http://schemas.microsoft.com/office/powerpoint/2010/main" val="4043776220"/>
+              </p:ext>
+            </p:extLst>
+          </p:nvPr>
+        </p:nvGraphicFramePr>
+        <p:xfrm>
+          <a:off x="6792215" y="4507123"/>
+          <a:ext cx="5231837" cy="2109547"/>
+        </p:xfrm>
+        <a:graphic>
+          <a:graphicData uri="http://schemas.openxmlformats.org/drawingml/2006/table">
+            <a:tbl>
+              <a:tblPr firstRow="1" bandRow="1">
+                <a:tableStyleId>{69CF1AB2-1976-4502-BF36-3FF5EA218861}</a:tableStyleId>
+              </a:tblPr>
+              <a:tblGrid>
+                <a:gridCol w="5231837">
+                  <a:extLst>
+                    <a:ext uri="{9D8B030D-6E8A-4147-A177-3AD203B41FA5}">
+                      <a16:colId xmlns:a16="http://schemas.microsoft.com/office/drawing/2014/main" val="3798824116"/>
+                    </a:ext>
+                  </a:extLst>
+                </a:gridCol>
+              </a:tblGrid>
+              <a:tr h="2109547">
+                <a:tc>
+                  <a:txBody>
+                    <a:bodyPr/>
+                    <a:lstStyle/>
+                    <a:p>
+                      <a:r>
+                        <a:rPr lang="en-US" sz="1200" dirty="0"/>
+                        <a:t>  </a:t>
+                      </a:r>
+                    </a:p>
+                    <a:p>
+                      <a:endParaRPr lang="en-US" sz="1200" dirty="0"/>
+                    </a:p>
+                    <a:p>
+                      <a:r>
+                        <a:rPr lang="en-US" sz="1200" dirty="0"/>
+                        <a:t>  Pros:</a:t>
+                      </a:r>
+                    </a:p>
+                    <a:p>
+                      <a:r>
+                        <a:rPr lang="en-US" sz="1200" b="0" dirty="0"/>
+                        <a:t>  Records are a lightweight type that can remove a lot of code.</a:t>
+                      </a:r>
+                    </a:p>
+                    <a:p>
+                      <a:r>
+                        <a:rPr lang="en-US" sz="1200" b="0" dirty="0"/>
+                        <a:t>  Structural equality and Referential equality.</a:t>
+                      </a:r>
+                    </a:p>
+                    <a:p>
+                      <a:r>
+                        <a:rPr lang="en-US" sz="1200" dirty="0"/>
+                        <a:t> </a:t>
+                      </a:r>
+                    </a:p>
+                    <a:p>
+                      <a:r>
+                        <a:rPr lang="en-US" sz="1200" dirty="0"/>
+                        <a:t>  Cons:</a:t>
+                      </a:r>
+                    </a:p>
+                    <a:p>
+                      <a:r>
+                        <a:rPr lang="en-US" sz="1200" b="0" dirty="0"/>
+                        <a:t>  Allocating a lot of objects.</a:t>
+                      </a:r>
+                      <a:endParaRPr lang="de-DE" sz="1200" b="0" dirty="0"/>
+                    </a:p>
+                    <a:p>
+                      <a:endParaRPr lang="en-US" sz="1200" dirty="0"/>
+                    </a:p>
+                  </a:txBody>
+                  <a:tcPr>
+                    <a:lnL w="12700" cap="flat" cmpd="sng" algn="ctr">
+                      <a:noFill/>
+                      <a:prstDash val="solid"/>
+                      <a:round/>
+                      <a:headEnd type="none" w="med" len="med"/>
+                      <a:tailEnd type="none" w="med" len="med"/>
+                    </a:lnL>
+                    <a:lnR w="12700" cap="flat" cmpd="sng" algn="ctr">
+                      <a:noFill/>
+                      <a:prstDash val="solid"/>
+                      <a:round/>
+                      <a:headEnd type="none" w="med" len="med"/>
+                      <a:tailEnd type="none" w="med" len="med"/>
+                    </a:lnR>
+                    <a:lnT w="12700" cap="flat" cmpd="sng" algn="ctr">
+                      <a:noFill/>
+                      <a:prstDash val="solid"/>
+                      <a:round/>
+                      <a:headEnd type="none" w="med" len="med"/>
+                      <a:tailEnd type="none" w="med" len="med"/>
+                    </a:lnT>
+                    <a:lnB w="12700" cap="flat" cmpd="sng" algn="ctr">
+                      <a:noFill/>
+                      <a:prstDash val="solid"/>
+                      <a:round/>
+                      <a:headEnd type="none" w="med" len="med"/>
+                      <a:tailEnd type="none" w="med" len="med"/>
+                    </a:lnB>
+                    <a:lnTlToBr w="12700" cmpd="sng">
+                      <a:noFill/>
+                      <a:prstDash val="solid"/>
+                    </a:lnTlToBr>
+                    <a:lnBlToTr w="12700" cmpd="sng">
+                      <a:noFill/>
+                      <a:prstDash val="solid"/>
+                    </a:lnBlToTr>
+                    <a:solidFill>
+                      <a:srgbClr val="E9EBF5"/>
+                    </a:solidFill>
+                  </a:tcPr>
+                </a:tc>
+                <a:extLst>
+                  <a:ext uri="{0D108BD9-81ED-4DB2-BD59-A6C34878D82A}">
+                    <a16:rowId xmlns:a16="http://schemas.microsoft.com/office/drawing/2014/main" val="3129916919"/>
+                  </a:ext>
+                </a:extLst>
+              </a:tr>
+            </a:tbl>
+          </a:graphicData>
+        </a:graphic>
+      </p:graphicFrame>
     </p:spTree>
     <p:extLst>
       <p:ext uri="{BB962C8B-B14F-4D97-AF65-F5344CB8AC3E}">
@@ -4637,7 +5211,7 @@
           <p:nvPr>
             <p:extLst>
               <p:ext uri="{D42A27DB-BD31-4B8C-83A1-F6EECF244321}">
-                <p14:modId xmlns:p14="http://schemas.microsoft.com/office/powerpoint/2010/main" val="4078802034"/>
+                <p14:modId xmlns:p14="http://schemas.microsoft.com/office/powerpoint/2010/main" val="3160457278"/>
               </p:ext>
             </p:extLst>
           </p:nvPr>
@@ -4981,7 +5555,24 @@
                         <a:rPr lang="en-US" sz="1000" b="0" dirty="0">
                           <a:latin typeface="Consolas" panose="020B0609020204030204" pitchFamily="49" charset="0"/>
                         </a:rPr>
-                        <a:t> Person("</a:t>
+                        <a:t> </a:t>
+                      </a:r>
+                      <a:r>
+                        <a:rPr lang="en-US" sz="1000" b="0" dirty="0">
+                          <a:solidFill>
+                            <a:schemeClr val="bg2">
+                              <a:lumMod val="50000"/>
+                            </a:schemeClr>
+                          </a:solidFill>
+                          <a:latin typeface="Consolas" panose="020B0609020204030204" pitchFamily="49" charset="0"/>
+                        </a:rPr>
+                        <a:t>Person</a:t>
+                      </a:r>
+                      <a:r>
+                        <a:rPr lang="en-US" sz="1000" b="0" dirty="0">
+                          <a:latin typeface="Consolas" panose="020B0609020204030204" pitchFamily="49" charset="0"/>
+                        </a:rPr>
+                        <a:t>("</a:t>
                       </a:r>
                       <a:r>
                         <a:rPr lang="en-US" sz="1000" b="0" dirty="0">
@@ -5310,7 +5901,7 @@
           <p:nvPr>
             <p:extLst>
               <p:ext uri="{D42A27DB-BD31-4B8C-83A1-F6EECF244321}">
-                <p14:modId xmlns:p14="http://schemas.microsoft.com/office/powerpoint/2010/main" val="3498845147"/>
+                <p14:modId xmlns:p14="http://schemas.microsoft.com/office/powerpoint/2010/main" val="1752482379"/>
               </p:ext>
             </p:extLst>
           </p:nvPr>
@@ -5374,7 +5965,24 @@
                         <a:rPr lang="en-US" sz="1000" b="0" dirty="0">
                           <a:latin typeface="Consolas" panose="020B0609020204030204" pitchFamily="49" charset="0"/>
                         </a:rPr>
-                        <a:t> Person("</a:t>
+                        <a:t> </a:t>
+                      </a:r>
+                      <a:r>
+                        <a:rPr lang="en-US" sz="1000" b="0" dirty="0">
+                          <a:solidFill>
+                            <a:schemeClr val="bg2">
+                              <a:lumMod val="50000"/>
+                            </a:schemeClr>
+                          </a:solidFill>
+                          <a:latin typeface="Consolas" panose="020B0609020204030204" pitchFamily="49" charset="0"/>
+                        </a:rPr>
+                        <a:t>Person</a:t>
+                      </a:r>
+                      <a:r>
+                        <a:rPr lang="en-US" sz="1000" b="0" dirty="0">
+                          <a:latin typeface="Consolas" panose="020B0609020204030204" pitchFamily="49" charset="0"/>
+                        </a:rPr>
+                        <a:t>("</a:t>
                       </a:r>
                       <a:r>
                         <a:rPr lang="en-US" sz="1000" b="0" dirty="0">
@@ -5720,7 +6328,24 @@
                         <a:rPr lang="en-US" sz="1000" b="0" dirty="0">
                           <a:latin typeface="Consolas" panose="020B0609020204030204" pitchFamily="49" charset="0"/>
                         </a:rPr>
-                        <a:t> Person("</a:t>
+                        <a:t> </a:t>
+                      </a:r>
+                      <a:r>
+                        <a:rPr lang="en-US" sz="1000" b="0" dirty="0">
+                          <a:solidFill>
+                            <a:schemeClr val="bg2">
+                              <a:lumMod val="50000"/>
+                            </a:schemeClr>
+                          </a:solidFill>
+                          <a:latin typeface="Consolas" panose="020B0609020204030204" pitchFamily="49" charset="0"/>
+                        </a:rPr>
+                        <a:t>Person</a:t>
+                      </a:r>
+                      <a:r>
+                        <a:rPr lang="en-US" sz="1000" b="0" dirty="0">
+                          <a:latin typeface="Consolas" panose="020B0609020204030204" pitchFamily="49" charset="0"/>
+                        </a:rPr>
+                        <a:t>("</a:t>
                       </a:r>
                       <a:r>
                         <a:rPr lang="en-US" sz="1000" b="0" dirty="0">
@@ -5995,7 +6620,7 @@
           <p:nvPr>
             <p:extLst>
               <p:ext uri="{D42A27DB-BD31-4B8C-83A1-F6EECF244321}">
-                <p14:modId xmlns:p14="http://schemas.microsoft.com/office/powerpoint/2010/main" val="836163661"/>
+                <p14:modId xmlns:p14="http://schemas.microsoft.com/office/powerpoint/2010/main" val="1722749975"/>
               </p:ext>
             </p:extLst>
           </p:nvPr>
@@ -6046,6 +6671,11 @@
                       </a:r>
                       <a:r>
                         <a:rPr lang="en-US" sz="1000" b="0" dirty="0" err="1">
+                          <a:solidFill>
+                            <a:schemeClr val="bg2">
+                              <a:lumMod val="50000"/>
+                            </a:schemeClr>
+                          </a:solidFill>
                           <a:latin typeface="Consolas" panose="020B0609020204030204" pitchFamily="49" charset="0"/>
                         </a:rPr>
                         <a:t>IsNumber</a:t>
@@ -6132,6 +6762,11 @@
                       </a:r>
                       <a:r>
                         <a:rPr lang="en-US" sz="1000" b="0" dirty="0" err="1">
+                          <a:solidFill>
+                            <a:schemeClr val="bg2">
+                              <a:lumMod val="50000"/>
+                            </a:schemeClr>
+                          </a:solidFill>
                           <a:latin typeface="Consolas" panose="020B0609020204030204" pitchFamily="49" charset="0"/>
                         </a:rPr>
                         <a:t>IsNumber</a:t>
@@ -6152,13 +6787,13 @@
                         <a:t>true</a:t>
                       </a:r>
                       <a:r>
-                        <a:rPr lang="en-US" sz="1000" b="0">
+                        <a:rPr lang="en-US" sz="1000" b="0" dirty="0">
                           <a:latin typeface="Consolas" panose="020B0609020204030204" pitchFamily="49" charset="0"/>
                         </a:rPr>
                         <a:t>, </a:t>
                       </a:r>
                       <a:r>
-                        <a:rPr lang="en-US" sz="1000" b="0">
+                        <a:rPr lang="en-US" sz="1000" b="0" dirty="0">
                           <a:solidFill>
                             <a:srgbClr val="0000FF"/>
                           </a:solidFill>
@@ -6167,14 +6802,11 @@
                         <a:t>10</a:t>
                       </a:r>
                       <a:r>
-                        <a:rPr lang="en-US" sz="1000" b="0">
+                        <a:rPr lang="en-US" sz="1000" b="0" dirty="0">
                           <a:latin typeface="Consolas" panose="020B0609020204030204" pitchFamily="49" charset="0"/>
                         </a:rPr>
                         <a:t>);</a:t>
                       </a:r>
-                      <a:endParaRPr lang="en-US" sz="1000" b="0" dirty="0">
-                        <a:latin typeface="Consolas" panose="020B0609020204030204" pitchFamily="49" charset="0"/>
-                      </a:endParaRPr>
                     </a:p>
                     <a:p>
                       <a:r>
@@ -7217,7 +7849,7 @@
           <p:nvPr>
             <p:extLst>
               <p:ext uri="{D42A27DB-BD31-4B8C-83A1-F6EECF244321}">
-                <p14:modId xmlns:p14="http://schemas.microsoft.com/office/powerpoint/2010/main" val="1984392072"/>
+                <p14:modId xmlns:p14="http://schemas.microsoft.com/office/powerpoint/2010/main" val="2838404123"/>
               </p:ext>
             </p:extLst>
           </p:nvPr>
@@ -7309,10 +7941,22 @@
                         <a:t> </a:t>
                       </a:r>
                       <a:r>
-                        <a:rPr lang="en-US" sz="1200" dirty="0" err="1"/>
+                        <a:rPr lang="en-US" sz="1200" dirty="0" err="1">
+                          <a:solidFill>
+                            <a:schemeClr val="bg2">
+                              <a:lumMod val="50000"/>
+                            </a:schemeClr>
+                          </a:solidFill>
+                        </a:rPr>
                         <a:t>InitDemo</a:t>
                       </a:r>
-                      <a:endParaRPr lang="en-US" sz="1200" dirty="0"/>
+                      <a:endParaRPr lang="en-US" sz="1200" dirty="0">
+                        <a:solidFill>
+                          <a:schemeClr val="bg2">
+                            <a:lumMod val="50000"/>
+                          </a:schemeClr>
+                        </a:solidFill>
+                      </a:endParaRPr>
                     </a:p>
                     <a:p>
                       <a:r>
@@ -7563,7 +8207,7 @@
           <p:nvPr>
             <p:extLst>
               <p:ext uri="{D42A27DB-BD31-4B8C-83A1-F6EECF244321}">
-                <p14:modId xmlns:p14="http://schemas.microsoft.com/office/powerpoint/2010/main" val="2181405718"/>
+                <p14:modId xmlns:p14="http://schemas.microsoft.com/office/powerpoint/2010/main" val="155311003"/>
               </p:ext>
             </p:extLst>
           </p:nvPr>
@@ -7638,12 +8282,23 @@
                     <a:p>
                       <a:r>
                         <a:rPr lang="en-US" sz="1200" dirty="0">
-                          <a:latin typeface="Consolas" panose="020B0609020204030204" pitchFamily="49" charset="0"/>
-                        </a:rPr>
-                        <a:t>Point p = </a:t>
+                          <a:solidFill>
+                            <a:schemeClr val="bg2">
+                              <a:lumMod val="50000"/>
+                            </a:schemeClr>
+                          </a:solidFill>
+                          <a:latin typeface="Consolas" panose="020B0609020204030204" pitchFamily="49" charset="0"/>
+                        </a:rPr>
+                        <a:t>Point</a:t>
                       </a:r>
                       <a:r>
                         <a:rPr lang="en-US" sz="1200" dirty="0">
+                          <a:latin typeface="Consolas" panose="020B0609020204030204" pitchFamily="49" charset="0"/>
+                        </a:rPr>
+                        <a:t> p = </a:t>
+                      </a:r>
+                      <a:r>
+                        <a:rPr lang="en-US" sz="1200" dirty="0">
                           <a:solidFill>
                             <a:srgbClr val="0000FF"/>
                           </a:solidFill>
@@ -7661,6 +8316,11 @@
                     <a:p>
                       <a:r>
                         <a:rPr lang="en-US" sz="1200" dirty="0" err="1">
+                          <a:solidFill>
+                            <a:schemeClr val="bg2">
+                              <a:lumMod val="50000"/>
+                            </a:schemeClr>
+                          </a:solidFill>
                           <a:latin typeface="Consolas" panose="020B0609020204030204" pitchFamily="49" charset="0"/>
                         </a:rPr>
                         <a:t>ConcurrentDictionary</a:t>
@@ -7732,6 +8392,11 @@
                     <a:p>
                       <a:r>
                         <a:rPr lang="en-US" sz="1200" dirty="0">
+                          <a:solidFill>
+                            <a:schemeClr val="bg2">
+                              <a:lumMod val="50000"/>
+                            </a:schemeClr>
+                          </a:solidFill>
                           <a:latin typeface="Consolas" panose="020B0609020204030204" pitchFamily="49" charset="0"/>
                         </a:rPr>
                         <a:t>Point</a:t>
@@ -8148,7 +8813,7 @@
           <p:nvPr>
             <p:extLst>
               <p:ext uri="{D42A27DB-BD31-4B8C-83A1-F6EECF244321}">
-                <p14:modId xmlns:p14="http://schemas.microsoft.com/office/powerpoint/2010/main" val="163403036"/>
+                <p14:modId xmlns:p14="http://schemas.microsoft.com/office/powerpoint/2010/main" val="2389781061"/>
               </p:ext>
             </p:extLst>
           </p:nvPr>
@@ -8302,6 +8967,11 @@
                       </a:r>
                       <a:r>
                         <a:rPr lang="en-US" sz="1000" dirty="0" err="1">
+                          <a:solidFill>
+                            <a:schemeClr val="bg2">
+                              <a:lumMod val="50000"/>
+                            </a:schemeClr>
+                          </a:solidFill>
                           <a:latin typeface="Consolas" panose="020B0609020204030204" pitchFamily="49" charset="0"/>
                         </a:rPr>
                         <a:t>DemoLocalsinit</a:t>
@@ -8541,7 +9211,7 @@
           <p:nvPr>
             <p:extLst>
               <p:ext uri="{D42A27DB-BD31-4B8C-83A1-F6EECF244321}">
-                <p14:modId xmlns:p14="http://schemas.microsoft.com/office/powerpoint/2010/main" val="2448277651"/>
+                <p14:modId xmlns:p14="http://schemas.microsoft.com/office/powerpoint/2010/main" val="3782040891"/>
               </p:ext>
             </p:extLst>
           </p:nvPr>
@@ -8605,7 +9275,13 @@
                         <a:t>This feature allows you to create an extension method to allow foreach loops on </a:t>
                       </a:r>
                       <a:r>
-                        <a:rPr lang="en-US" sz="1200" i="1" dirty="0" err="1"/>
+                        <a:rPr lang="en-US" sz="1200" i="1" dirty="0" err="1">
+                          <a:solidFill>
+                            <a:schemeClr val="bg2">
+                              <a:lumMod val="50000"/>
+                            </a:schemeClr>
+                          </a:solidFill>
+                        </a:rPr>
                         <a:t>IEnumerator</a:t>
                       </a:r>
                       <a:r>
@@ -8617,7 +9293,13 @@
                         <a:t>and </a:t>
                       </a:r>
                       <a:r>
-                        <a:rPr lang="en-US" sz="1200" i="1" dirty="0" err="1"/>
+                        <a:rPr lang="en-US" sz="1200" i="1" dirty="0" err="1">
+                          <a:solidFill>
+                            <a:schemeClr val="bg2">
+                              <a:lumMod val="50000"/>
+                            </a:schemeClr>
+                          </a:solidFill>
+                        </a:rPr>
                         <a:t>IAsyncEnumerator</a:t>
                       </a:r>
                       <a:r>
@@ -8647,6 +9329,11 @@
                       </a:r>
                       <a:r>
                         <a:rPr lang="en-US" sz="1000" dirty="0">
+                          <a:solidFill>
+                            <a:schemeClr val="bg2">
+                              <a:lumMod val="50000"/>
+                            </a:schemeClr>
+                          </a:solidFill>
                           <a:latin typeface="Consolas" panose="020B0609020204030204" pitchFamily="49" charset="0"/>
                         </a:rPr>
                         <a:t>Extensions</a:t>
@@ -8760,6 +9447,11 @@
                       </a:r>
                       <a:r>
                         <a:rPr lang="en-US" sz="1200" dirty="0" err="1">
+                          <a:solidFill>
+                            <a:schemeClr val="bg2">
+                              <a:lumMod val="50000"/>
+                            </a:schemeClr>
+                          </a:solidFill>
                           <a:latin typeface="Consolas" panose="020B0609020204030204" pitchFamily="49" charset="0"/>
                         </a:rPr>
                         <a:t>IEnumerator</a:t>
@@ -8783,7 +9475,24 @@
                         <a:rPr lang="en-US" sz="1200" dirty="0">
                           <a:latin typeface="Consolas" panose="020B0609020204030204" pitchFamily="49" charset="0"/>
                         </a:rPr>
-                        <a:t>&gt; enumerator = new Collection&lt;</a:t>
+                        <a:t>&gt; enumerator = new </a:t>
+                      </a:r>
+                      <a:r>
+                        <a:rPr lang="en-US" sz="1200" dirty="0">
+                          <a:solidFill>
+                            <a:schemeClr val="bg2">
+                              <a:lumMod val="50000"/>
+                            </a:schemeClr>
+                          </a:solidFill>
+                          <a:latin typeface="Consolas" panose="020B0609020204030204" pitchFamily="49" charset="0"/>
+                        </a:rPr>
+                        <a:t>Collection</a:t>
+                      </a:r>
+                      <a:r>
+                        <a:rPr lang="en-US" sz="1200" dirty="0">
+                          <a:latin typeface="Consolas" panose="020B0609020204030204" pitchFamily="49" charset="0"/>
+                        </a:rPr>
+                        <a:t>&lt;</a:t>
                       </a:r>
                       <a:r>
                         <a:rPr lang="en-US" sz="1200" dirty="0">
@@ -8988,7 +9697,7 @@
           <p:nvPr>
             <p:extLst>
               <p:ext uri="{D42A27DB-BD31-4B8C-83A1-F6EECF244321}">
-                <p14:modId xmlns:p14="http://schemas.microsoft.com/office/powerpoint/2010/main" val="3165325774"/>
+                <p14:modId xmlns:p14="http://schemas.microsoft.com/office/powerpoint/2010/main" val="2338682648"/>
               </p:ext>
             </p:extLst>
           </p:nvPr>
@@ -9068,7 +9777,13 @@
                     </a:p>
                     <a:p>
                       <a:r>
-                        <a:rPr lang="en-US" sz="1200" dirty="0" err="1"/>
+                        <a:rPr lang="en-US" sz="1200" dirty="0" err="1">
+                          <a:solidFill>
+                            <a:schemeClr val="bg2">
+                              <a:lumMod val="50000"/>
+                            </a:schemeClr>
+                          </a:solidFill>
+                        </a:rPr>
                         <a:t>Func</a:t>
                       </a:r>
                       <a:r>
@@ -9555,7 +10270,7 @@
           <p:nvPr>
             <p:extLst>
               <p:ext uri="{D42A27DB-BD31-4B8C-83A1-F6EECF244321}">
-                <p14:modId xmlns:p14="http://schemas.microsoft.com/office/powerpoint/2010/main" val="4047584241"/>
+                <p14:modId xmlns:p14="http://schemas.microsoft.com/office/powerpoint/2010/main" val="2733844329"/>
               </p:ext>
             </p:extLst>
           </p:nvPr>
@@ -9734,7 +10449,9 @@
                       <a:r>
                         <a:rPr lang="en-US" sz="900" kern="1200" dirty="0">
                           <a:solidFill>
-                            <a:schemeClr val="dk1"/>
+                            <a:schemeClr val="bg2">
+                              <a:lumMod val="50000"/>
+                            </a:schemeClr>
                           </a:solidFill>
                           <a:effectLst/>
                           <a:latin typeface="Consolas" panose="020B0609020204030204" pitchFamily="49" charset="0"/>
@@ -9897,7 +10614,9 @@
                       <a:r>
                         <a:rPr lang="en-US" sz="900" kern="1200" dirty="0">
                           <a:solidFill>
-                            <a:schemeClr val="dk1"/>
+                            <a:schemeClr val="bg2">
+                              <a:lumMod val="50000"/>
+                            </a:schemeClr>
                           </a:solidFill>
                           <a:effectLst/>
                           <a:latin typeface="Consolas" panose="020B0609020204030204" pitchFamily="49" charset="0"/>
@@ -10202,7 +10921,7 @@
           <p:nvPr>
             <p:extLst>
               <p:ext uri="{D42A27DB-BD31-4B8C-83A1-F6EECF244321}">
-                <p14:modId xmlns:p14="http://schemas.microsoft.com/office/powerpoint/2010/main" val="994257890"/>
+                <p14:modId xmlns:p14="http://schemas.microsoft.com/office/powerpoint/2010/main" val="3189005308"/>
               </p:ext>
             </p:extLst>
           </p:nvPr>
@@ -10307,7 +11026,9 @@
                       <a:r>
                         <a:rPr lang="en-US" sz="1000" dirty="0" err="1">
                           <a:solidFill>
-                            <a:srgbClr val="0000FF"/>
+                            <a:schemeClr val="bg2">
+                              <a:lumMod val="50000"/>
+                            </a:schemeClr>
                           </a:solidFill>
                           <a:latin typeface="Consolas" panose="020B0609020204030204" pitchFamily="49" charset="0"/>
                         </a:rPr>
@@ -10435,7 +11156,9 @@
                       <a:r>
                         <a:rPr lang="en-US" sz="1000" dirty="0" err="1">
                           <a:solidFill>
-                            <a:srgbClr val="0000FF"/>
+                            <a:schemeClr val="bg2">
+                              <a:lumMod val="50000"/>
+                            </a:schemeClr>
                           </a:solidFill>
                           <a:latin typeface="Consolas" panose="020B0609020204030204" pitchFamily="49" charset="0"/>
                         </a:rPr>
@@ -10569,7 +11292,7 @@
           <p:nvPr>
             <p:extLst>
               <p:ext uri="{D42A27DB-BD31-4B8C-83A1-F6EECF244321}">
-                <p14:modId xmlns:p14="http://schemas.microsoft.com/office/powerpoint/2010/main" val="2123258735"/>
+                <p14:modId xmlns:p14="http://schemas.microsoft.com/office/powerpoint/2010/main" val="3191568537"/>
               </p:ext>
             </p:extLst>
           </p:nvPr>
@@ -10659,9 +11382,20 @@
                       </a:r>
                       <a:r>
                         <a:rPr lang="en-US" sz="1100" dirty="0">
-                          <a:latin typeface="Consolas" panose="020B0609020204030204" pitchFamily="49" charset="0"/>
-                        </a:rPr>
-                        <a:t>Person </a:t>
+                          <a:solidFill>
+                            <a:schemeClr val="bg2">
+                              <a:lumMod val="50000"/>
+                            </a:schemeClr>
+                          </a:solidFill>
+                          <a:latin typeface="Consolas" panose="020B0609020204030204" pitchFamily="49" charset="0"/>
+                        </a:rPr>
+                        <a:t>Person</a:t>
+                      </a:r>
+                      <a:r>
+                        <a:rPr lang="en-US" sz="1100" dirty="0">
+                          <a:latin typeface="Consolas" panose="020B0609020204030204" pitchFamily="49" charset="0"/>
+                        </a:rPr>
+                        <a:t> </a:t>
                       </a:r>
                       <a:r>
                         <a:rPr lang="en-US" sz="1100" dirty="0" err="1">
@@ -10713,16 +11447,27 @@
                       </a:r>
                       <a:r>
                         <a:rPr lang="en-US" sz="1100" dirty="0">
-                          <a:latin typeface="Consolas" panose="020B0609020204030204" pitchFamily="49" charset="0"/>
-                        </a:rPr>
-                        <a:t>Person();</a:t>
-                      </a:r>
-                    </a:p>
-                    <a:p>
+                          <a:solidFill>
+                            <a:schemeClr val="bg2">
+                              <a:lumMod val="50000"/>
+                            </a:schemeClr>
+                          </a:solidFill>
+                          <a:latin typeface="Consolas" panose="020B0609020204030204" pitchFamily="49" charset="0"/>
+                        </a:rPr>
+                        <a:t>Person</a:t>
+                      </a:r>
                       <a:r>
                         <a:rPr lang="en-US" sz="1100" dirty="0">
                           <a:latin typeface="Consolas" panose="020B0609020204030204" pitchFamily="49" charset="0"/>
                         </a:rPr>
+                        <a:t>();</a:t>
+                      </a:r>
+                    </a:p>
+                    <a:p>
+                      <a:r>
+                        <a:rPr lang="en-US" sz="1100" dirty="0">
+                          <a:latin typeface="Consolas" panose="020B0609020204030204" pitchFamily="49" charset="0"/>
+                        </a:rPr>
                         <a:t>}</a:t>
                       </a:r>
                     </a:p>
@@ -10746,9 +11491,20 @@
                       </a:r>
                       <a:r>
                         <a:rPr lang="en-US" sz="1100" dirty="0">
-                          <a:latin typeface="Consolas" panose="020B0609020204030204" pitchFamily="49" charset="0"/>
-                        </a:rPr>
-                        <a:t>Person </a:t>
+                          <a:solidFill>
+                            <a:schemeClr val="bg2">
+                              <a:lumMod val="50000"/>
+                            </a:schemeClr>
+                          </a:solidFill>
+                          <a:latin typeface="Consolas" panose="020B0609020204030204" pitchFamily="49" charset="0"/>
+                        </a:rPr>
+                        <a:t>Person</a:t>
+                      </a:r>
+                      <a:r>
+                        <a:rPr lang="en-US" sz="1100" dirty="0">
+                          <a:latin typeface="Consolas" panose="020B0609020204030204" pitchFamily="49" charset="0"/>
+                        </a:rPr>
+                        <a:t> </a:t>
                       </a:r>
                       <a:r>
                         <a:rPr lang="en-US" sz="1100" dirty="0" err="1">
@@ -10800,9 +11556,20 @@
                       </a:r>
                       <a:r>
                         <a:rPr lang="en-US" sz="1000" dirty="0">
-                          <a:latin typeface="Consolas" panose="020B0609020204030204" pitchFamily="49" charset="0"/>
-                        </a:rPr>
-                        <a:t>Student();</a:t>
+                          <a:solidFill>
+                            <a:schemeClr val="bg2">
+                              <a:lumMod val="50000"/>
+                            </a:schemeClr>
+                          </a:solidFill>
+                          <a:latin typeface="Consolas" panose="020B0609020204030204" pitchFamily="49" charset="0"/>
+                        </a:rPr>
+                        <a:t>Student</a:t>
+                      </a:r>
+                      <a:r>
+                        <a:rPr lang="en-US" sz="1000" dirty="0">
+                          <a:latin typeface="Consolas" panose="020B0609020204030204" pitchFamily="49" charset="0"/>
+                        </a:rPr>
+                        <a:t>();</a:t>
                       </a:r>
                     </a:p>
                     <a:p>
@@ -10843,9 +11610,20 @@
                       </a:r>
                       <a:r>
                         <a:rPr lang="en-US" sz="1200" dirty="0">
-                          <a:latin typeface="Consolas" panose="020B0609020204030204" pitchFamily="49" charset="0"/>
-                        </a:rPr>
-                        <a:t>Person </a:t>
+                          <a:solidFill>
+                            <a:schemeClr val="bg2">
+                              <a:lumMod val="50000"/>
+                            </a:schemeClr>
+                          </a:solidFill>
+                          <a:latin typeface="Consolas" panose="020B0609020204030204" pitchFamily="49" charset="0"/>
+                        </a:rPr>
+                        <a:t>Person</a:t>
+                      </a:r>
+                      <a:r>
+                        <a:rPr lang="en-US" sz="1200" dirty="0">
+                          <a:latin typeface="Consolas" panose="020B0609020204030204" pitchFamily="49" charset="0"/>
+                        </a:rPr>
+                        <a:t> </a:t>
                       </a:r>
                       <a:r>
                         <a:rPr lang="en-US" sz="1200" dirty="0" err="1">
@@ -10884,12 +11662,29 @@
                         <a:rPr lang="en-US" sz="1200" dirty="0">
                           <a:latin typeface="Consolas" panose="020B0609020204030204" pitchFamily="49" charset="0"/>
                         </a:rPr>
-                        <a:t>    return new Person();</a:t>
-                      </a:r>
-                    </a:p>
-                    <a:p>
+                        <a:t>    return new </a:t>
+                      </a:r>
                       <a:r>
                         <a:rPr lang="en-US" sz="1200" dirty="0">
+                          <a:solidFill>
+                            <a:schemeClr val="bg2">
+                              <a:lumMod val="50000"/>
+                            </a:schemeClr>
+                          </a:solidFill>
+                          <a:latin typeface="Consolas" panose="020B0609020204030204" pitchFamily="49" charset="0"/>
+                        </a:rPr>
+                        <a:t>Person</a:t>
+                      </a:r>
+                      <a:r>
+                        <a:rPr lang="en-US" sz="1200" dirty="0">
+                          <a:latin typeface="Consolas" panose="020B0609020204030204" pitchFamily="49" charset="0"/>
+                        </a:rPr>
+                        <a:t>();</a:t>
+                      </a:r>
+                    </a:p>
+                    <a:p>
+                      <a:r>
+                        <a:rPr lang="en-US" sz="1200" dirty="0">
                           <a:latin typeface="Consolas" panose="020B0609020204030204" pitchFamily="49" charset="0"/>
                         </a:rPr>
                         <a:t>}</a:t>
@@ -10915,9 +11710,20 @@
                       </a:r>
                       <a:r>
                         <a:rPr lang="en-US" sz="1200" dirty="0">
-                          <a:latin typeface="Consolas" panose="020B0609020204030204" pitchFamily="49" charset="0"/>
-                        </a:rPr>
-                        <a:t>Student </a:t>
+                          <a:solidFill>
+                            <a:schemeClr val="bg2">
+                              <a:lumMod val="50000"/>
+                            </a:schemeClr>
+                          </a:solidFill>
+                          <a:latin typeface="Consolas" panose="020B0609020204030204" pitchFamily="49" charset="0"/>
+                        </a:rPr>
+                        <a:t>Student</a:t>
+                      </a:r>
+                      <a:r>
+                        <a:rPr lang="en-US" sz="1200" dirty="0">
+                          <a:latin typeface="Consolas" panose="020B0609020204030204" pitchFamily="49" charset="0"/>
+                        </a:rPr>
+                        <a:t> </a:t>
                       </a:r>
                       <a:r>
                         <a:rPr lang="en-US" sz="1200" dirty="0" err="1">
@@ -10969,9 +11775,20 @@
                       </a:r>
                       <a:r>
                         <a:rPr lang="en-US" sz="1200" dirty="0">
-                          <a:latin typeface="Consolas" panose="020B0609020204030204" pitchFamily="49" charset="0"/>
-                        </a:rPr>
-                        <a:t>Student();</a:t>
+                          <a:solidFill>
+                            <a:schemeClr val="bg2">
+                              <a:lumMod val="50000"/>
+                            </a:schemeClr>
+                          </a:solidFill>
+                          <a:latin typeface="Consolas" panose="020B0609020204030204" pitchFamily="49" charset="0"/>
+                        </a:rPr>
+                        <a:t>Student</a:t>
+                      </a:r>
+                      <a:r>
+                        <a:rPr lang="en-US" sz="1200" dirty="0">
+                          <a:latin typeface="Consolas" panose="020B0609020204030204" pitchFamily="49" charset="0"/>
+                        </a:rPr>
+                        <a:t>();</a:t>
                       </a:r>
                     </a:p>
                     <a:p>
@@ -11032,7 +11849,7 @@
           <p:nvPr>
             <p:extLst>
               <p:ext uri="{D42A27DB-BD31-4B8C-83A1-F6EECF244321}">
-                <p14:modId xmlns:p14="http://schemas.microsoft.com/office/powerpoint/2010/main" val="2454230313"/>
+                <p14:modId xmlns:p14="http://schemas.microsoft.com/office/powerpoint/2010/main" val="1170215749"/>
               </p:ext>
             </p:extLst>
           </p:nvPr>
@@ -11192,7 +12009,9 @@
                       <a:r>
                         <a:rPr lang="en-US" sz="1100" kern="1200" dirty="0" err="1">
                           <a:solidFill>
-                            <a:schemeClr val="dk1"/>
+                            <a:schemeClr val="bg2">
+                              <a:lumMod val="50000"/>
+                            </a:schemeClr>
                           </a:solidFill>
                           <a:effectLst/>
                           <a:latin typeface="+mn-lt"/>
@@ -11653,7 +12472,7 @@
           <p:nvPr>
             <p:extLst>
               <p:ext uri="{D42A27DB-BD31-4B8C-83A1-F6EECF244321}">
-                <p14:modId xmlns:p14="http://schemas.microsoft.com/office/powerpoint/2010/main" val="2856967971"/>
+                <p14:modId xmlns:p14="http://schemas.microsoft.com/office/powerpoint/2010/main" val="1873136587"/>
               </p:ext>
             </p:extLst>
           </p:nvPr>
@@ -11743,11 +12562,21 @@
                       </a:r>
                       <a:r>
                         <a:rPr lang="en-US" sz="950" dirty="0" err="1">
+                          <a:solidFill>
+                            <a:schemeClr val="bg2">
+                              <a:lumMod val="50000"/>
+                            </a:schemeClr>
+                          </a:solidFill>
                           <a:latin typeface="Consolas" panose="020B0609020204030204" pitchFamily="49" charset="0"/>
                         </a:rPr>
                         <a:t>FunctionPointer</a:t>
                       </a:r>
                       <a:endParaRPr lang="en-US" sz="950" dirty="0">
+                        <a:solidFill>
+                          <a:schemeClr val="bg2">
+                            <a:lumMod val="50000"/>
+                          </a:schemeClr>
+                        </a:solidFill>
                         <a:latin typeface="Consolas" panose="020B0609020204030204" pitchFamily="49" charset="0"/>
                       </a:endParaRPr>
                     </a:p>
@@ -11985,25 +12814,7 @@
                           </a:solidFill>
                           <a:latin typeface="Consolas" panose="020B0609020204030204" pitchFamily="49" charset="0"/>
                         </a:rPr>
-                        <a:t>  </a:t>
-                      </a:r>
-                      <a:r>
-                        <a:rPr lang="en-US" sz="1000">
-                          <a:solidFill>
-                            <a:srgbClr val="23735D"/>
-                          </a:solidFill>
-                          <a:latin typeface="Consolas" panose="020B0609020204030204" pitchFamily="49" charset="0"/>
-                        </a:rPr>
-                        <a:t>// Output: </a:t>
-                      </a:r>
-                      <a:r>
-                        <a:rPr lang="en-US" sz="1000" dirty="0">
-                          <a:solidFill>
-                            <a:srgbClr val="23735D"/>
-                          </a:solidFill>
-                          <a:latin typeface="Consolas" panose="020B0609020204030204" pitchFamily="49" charset="0"/>
-                        </a:rPr>
-                        <a:t>4</a:t>
+                        <a:t>  // Output: 4</a:t>
                       </a:r>
                     </a:p>
                     <a:p>

</xml_diff>